<commit_message>
updates to examples and powerpoint
</commit_message>
<xml_diff>
--- a/PPT/Day_30.pptx
+++ b/PPT/Day_30.pptx
@@ -5,7 +5,7 @@
     <p:sldMasterId id="2147483690" r:id="rId1"/>
   </p:sldMasterIdLst>
   <p:notesMasterIdLst>
-    <p:notesMasterId r:id="rId18"/>
+    <p:notesMasterId r:id="rId20"/>
   </p:notesMasterIdLst>
   <p:sldIdLst>
     <p:sldId id="256" r:id="rId2"/>
@@ -14,16 +14,18 @@
     <p:sldId id="328" r:id="rId5"/>
     <p:sldId id="329" r:id="rId6"/>
     <p:sldId id="330" r:id="rId7"/>
-    <p:sldId id="315" r:id="rId8"/>
-    <p:sldId id="331" r:id="rId9"/>
-    <p:sldId id="318" r:id="rId10"/>
-    <p:sldId id="320" r:id="rId11"/>
-    <p:sldId id="321" r:id="rId12"/>
-    <p:sldId id="319" r:id="rId13"/>
-    <p:sldId id="322" r:id="rId14"/>
-    <p:sldId id="323" r:id="rId15"/>
-    <p:sldId id="332" r:id="rId16"/>
-    <p:sldId id="270" r:id="rId17"/>
+    <p:sldId id="333" r:id="rId8"/>
+    <p:sldId id="334" r:id="rId9"/>
+    <p:sldId id="315" r:id="rId10"/>
+    <p:sldId id="331" r:id="rId11"/>
+    <p:sldId id="318" r:id="rId12"/>
+    <p:sldId id="320" r:id="rId13"/>
+    <p:sldId id="321" r:id="rId14"/>
+    <p:sldId id="319" r:id="rId15"/>
+    <p:sldId id="322" r:id="rId16"/>
+    <p:sldId id="323" r:id="rId17"/>
+    <p:sldId id="332" r:id="rId18"/>
+    <p:sldId id="270" r:id="rId19"/>
   </p:sldIdLst>
   <p:sldSz cx="9144000" cy="6858000" type="screen4x3"/>
   <p:notesSz cx="7010400" cy="9296400"/>
@@ -317,7 +319,7 @@
           <a:p>
             <a:fld id="{D01D034C-CF51-4B22-9742-2A4F1E78825C}" type="datetimeFigureOut">
               <a:rPr lang="en-US" smtClean="0"/>
-              <a:t>5/11/2021</a:t>
+              <a:t>5/14/2021</a:t>
             </a:fld>
             <a:endParaRPr lang="en-US"/>
           </a:p>
@@ -37027,6 +37029,411 @@
           <a:p>
             <a:r>
               <a:rPr lang="en-US" dirty="0"/>
+              <a:t>Reflections API</a:t>
+            </a:r>
+          </a:p>
+        </p:txBody>
+      </p:sp>
+      <p:sp>
+        <p:nvSpPr>
+          <p:cNvPr id="3" name="Text Placeholder 2">
+            <a:extLst>
+              <a:ext uri="{FF2B5EF4-FFF2-40B4-BE49-F238E27FC236}">
+                <a16:creationId xmlns:a16="http://schemas.microsoft.com/office/drawing/2014/main" id="{0C6BA468-B2FB-4410-8CC4-82872A4103B6}"/>
+              </a:ext>
+            </a:extLst>
+          </p:cNvPr>
+          <p:cNvSpPr>
+            <a:spLocks noGrp="1"/>
+          </p:cNvSpPr>
+          <p:nvPr>
+            <p:ph type="body" idx="1"/>
+          </p:nvPr>
+        </p:nvSpPr>
+        <p:spPr>
+          <a:xfrm>
+            <a:off x="380010" y="1378226"/>
+            <a:ext cx="8383980" cy="5350611"/>
+          </a:xfrm>
+        </p:spPr>
+        <p:txBody>
+          <a:bodyPr>
+            <a:normAutofit fontScale="77500" lnSpcReduction="20000"/>
+          </a:bodyPr>
+          <a:lstStyle/>
+          <a:p>
+            <a:r>
+              <a:rPr lang="en-US" dirty="0"/>
+              <a:t>The reflections API includes (but is not limited to):</a:t>
+            </a:r>
+          </a:p>
+          <a:p>
+            <a:pPr lvl="1"/>
+            <a:r>
+              <a:rPr lang="en-US" b="1" dirty="0"/>
+              <a:t>Class*</a:t>
+            </a:r>
+            <a:r>
+              <a:rPr lang="en-US" dirty="0"/>
+              <a:t> – provides a representation of classes and interfaces running in a java application</a:t>
+            </a:r>
+          </a:p>
+          <a:p>
+            <a:pPr lvl="2"/>
+            <a:r>
+              <a:rPr lang="en-US" dirty="0"/>
+              <a:t>*Technically Class is part of the </a:t>
+            </a:r>
+            <a:r>
+              <a:rPr lang="en-US" dirty="0" err="1"/>
+              <a:t>java.lang</a:t>
+            </a:r>
+            <a:r>
+              <a:rPr lang="en-US" dirty="0"/>
+              <a:t> package, but is widely used in the reflections API, and reflection operations.</a:t>
+            </a:r>
+          </a:p>
+          <a:p>
+            <a:pPr lvl="1"/>
+            <a:r>
+              <a:rPr lang="en-US" b="1" dirty="0"/>
+              <a:t>Constructor</a:t>
+            </a:r>
+            <a:r>
+              <a:rPr lang="en-US" dirty="0"/>
+              <a:t> – provides a representation of, and access to, a constructor method declared in a class.</a:t>
+            </a:r>
+          </a:p>
+          <a:p>
+            <a:pPr lvl="1"/>
+            <a:r>
+              <a:rPr lang="en-US" b="1" dirty="0"/>
+              <a:t>Method</a:t>
+            </a:r>
+            <a:r>
+              <a:rPr lang="en-US" dirty="0"/>
+              <a:t> – provides a representation of, and access to, a single method declared in a class, including access information and parameters. Method can be instance or class methods, as well as abstract.</a:t>
+            </a:r>
+            <a:endParaRPr lang="en-US" b="1" dirty="0"/>
+          </a:p>
+          <a:p>
+            <a:pPr lvl="1"/>
+            <a:r>
+              <a:rPr lang="en-US" b="1" dirty="0"/>
+              <a:t>Field</a:t>
+            </a:r>
+            <a:r>
+              <a:rPr lang="en-US" dirty="0"/>
+              <a:t> – provides a representation of, and access to, a single field/variable declared in a class, including access information, modifiers and datatype. Field can be static or instance.</a:t>
+            </a:r>
+          </a:p>
+          <a:p>
+            <a:pPr lvl="1"/>
+            <a:r>
+              <a:rPr lang="en-US" b="1" dirty="0"/>
+              <a:t>Modifier</a:t>
+            </a:r>
+            <a:r>
+              <a:rPr lang="en-US" dirty="0"/>
+              <a:t> – a class that provides static methods and constants used to decode modifiers on a method or field.</a:t>
+            </a:r>
+          </a:p>
+          <a:p>
+            <a:pPr lvl="2"/>
+            <a:r>
+              <a:rPr lang="en-US" dirty="0"/>
+              <a:t>Modifiers are represented using integers with distinct bit positions.</a:t>
+            </a:r>
+          </a:p>
+          <a:p>
+            <a:pPr lvl="1"/>
+            <a:r>
+              <a:rPr lang="en-US" b="1" dirty="0"/>
+              <a:t>Parameter</a:t>
+            </a:r>
+            <a:r>
+              <a:rPr lang="en-US" dirty="0"/>
+              <a:t> – a class which represents information about a method’s parameters, including the name, modifiers and parameter position.</a:t>
+            </a:r>
+          </a:p>
+        </p:txBody>
+      </p:sp>
+      <p:sp>
+        <p:nvSpPr>
+          <p:cNvPr id="4" name="Slide Number Placeholder 3">
+            <a:extLst>
+              <a:ext uri="{FF2B5EF4-FFF2-40B4-BE49-F238E27FC236}">
+                <a16:creationId xmlns:a16="http://schemas.microsoft.com/office/drawing/2014/main" id="{483A7CCD-D4F0-4527-9651-963B2389435E}"/>
+              </a:ext>
+            </a:extLst>
+          </p:cNvPr>
+          <p:cNvSpPr>
+            <a:spLocks noGrp="1"/>
+          </p:cNvSpPr>
+          <p:nvPr>
+            <p:ph type="sldNum" idx="12"/>
+          </p:nvPr>
+        </p:nvSpPr>
+        <p:spPr/>
+        <p:txBody>
+          <a:bodyPr/>
+          <a:lstStyle/>
+          <a:p>
+            <a:pPr marL="0" lvl="0" indent="0" algn="r" rtl="0">
+              <a:spcBef>
+                <a:spcPts val="0"/>
+              </a:spcBef>
+              <a:spcAft>
+                <a:spcPts val="0"/>
+              </a:spcAft>
+              <a:buNone/>
+            </a:pPr>
+            <a:fld id="{00000000-1234-1234-1234-123412341234}" type="slidenum">
+              <a:rPr lang="en-US" smtClean="0"/>
+              <a:t>9</a:t>
+            </a:fld>
+            <a:endParaRPr lang="en-US"/>
+          </a:p>
+        </p:txBody>
+      </p:sp>
+    </p:spTree>
+    <p:extLst>
+      <p:ext uri="{BB962C8B-B14F-4D97-AF65-F5344CB8AC3E}">
+        <p14:creationId xmlns:p14="http://schemas.microsoft.com/office/powerpoint/2010/main" val="90686638"/>
+      </p:ext>
+    </p:extLst>
+  </p:cSld>
+  <p:clrMapOvr>
+    <a:masterClrMapping/>
+  </p:clrMapOvr>
+</p:sld>
+</file>
+
+<file path=ppt/slides/slide11.xml><?xml version="1.0" encoding="utf-8"?>
+<p:sld xmlns:a="http://schemas.openxmlformats.org/drawingml/2006/main" xmlns:r="http://schemas.openxmlformats.org/officeDocument/2006/relationships" xmlns:p="http://schemas.openxmlformats.org/presentationml/2006/main">
+  <p:cSld>
+    <p:spTree>
+      <p:nvGrpSpPr>
+        <p:cNvPr id="1" name=""/>
+        <p:cNvGrpSpPr/>
+        <p:nvPr/>
+      </p:nvGrpSpPr>
+      <p:grpSpPr>
+        <a:xfrm>
+          <a:off x="0" y="0"/>
+          <a:ext cx="0" cy="0"/>
+          <a:chOff x="0" y="0"/>
+          <a:chExt cx="0" cy="0"/>
+        </a:xfrm>
+      </p:grpSpPr>
+      <p:sp>
+        <p:nvSpPr>
+          <p:cNvPr id="2" name="Title 1">
+            <a:extLst>
+              <a:ext uri="{FF2B5EF4-FFF2-40B4-BE49-F238E27FC236}">
+                <a16:creationId xmlns:a16="http://schemas.microsoft.com/office/drawing/2014/main" id="{437930B4-E996-4435-B9F1-D407853E2C03}"/>
+              </a:ext>
+            </a:extLst>
+          </p:cNvPr>
+          <p:cNvSpPr>
+            <a:spLocks noGrp="1"/>
+          </p:cNvSpPr>
+          <p:nvPr>
+            <p:ph type="title"/>
+          </p:nvPr>
+        </p:nvSpPr>
+        <p:spPr/>
+        <p:txBody>
+          <a:bodyPr/>
+          <a:lstStyle/>
+          <a:p>
+            <a:r>
+              <a:rPr lang="en-US" dirty="0"/>
+              <a:t>Class Features</a:t>
+            </a:r>
+          </a:p>
+        </p:txBody>
+      </p:sp>
+      <p:sp>
+        <p:nvSpPr>
+          <p:cNvPr id="3" name="Text Placeholder 2">
+            <a:extLst>
+              <a:ext uri="{FF2B5EF4-FFF2-40B4-BE49-F238E27FC236}">
+                <a16:creationId xmlns:a16="http://schemas.microsoft.com/office/drawing/2014/main" id="{0C6BA468-B2FB-4410-8CC4-82872A4103B6}"/>
+              </a:ext>
+            </a:extLst>
+          </p:cNvPr>
+          <p:cNvSpPr>
+            <a:spLocks noGrp="1"/>
+          </p:cNvSpPr>
+          <p:nvPr>
+            <p:ph type="body" idx="1"/>
+          </p:nvPr>
+        </p:nvSpPr>
+        <p:spPr>
+          <a:xfrm>
+            <a:off x="380010" y="1378226"/>
+            <a:ext cx="8383980" cy="5350611"/>
+          </a:xfrm>
+        </p:spPr>
+        <p:txBody>
+          <a:bodyPr>
+            <a:normAutofit fontScale="85000" lnSpcReduction="10000"/>
+          </a:bodyPr>
+          <a:lstStyle/>
+          <a:p>
+            <a:r>
+              <a:rPr lang="en-US" b="1" dirty="0"/>
+              <a:t>cast </a:t>
+            </a:r>
+            <a:r>
+              <a:rPr lang="en-US" dirty="0"/>
+              <a:t>– casts the object as a representation of another.</a:t>
+            </a:r>
+          </a:p>
+          <a:p>
+            <a:r>
+              <a:rPr lang="en-US" b="1" dirty="0" err="1"/>
+              <a:t>getDeclaredConstructor</a:t>
+            </a:r>
+            <a:r>
+              <a:rPr lang="en-US" dirty="0"/>
+              <a:t> – returns a Constructor object that reflects the constructor specified by parameter types</a:t>
+            </a:r>
+          </a:p>
+          <a:p>
+            <a:r>
+              <a:rPr lang="en-US" b="1" dirty="0" err="1"/>
+              <a:t>getConstructors</a:t>
+            </a:r>
+            <a:r>
+              <a:rPr lang="en-US" dirty="0"/>
+              <a:t> – returns an array containing Constructor objects which reflect all public constructors of the class</a:t>
+            </a:r>
+          </a:p>
+          <a:p>
+            <a:r>
+              <a:rPr lang="en-US" b="1" dirty="0" err="1"/>
+              <a:t>getDeclaredMethods</a:t>
+            </a:r>
+            <a:r>
+              <a:rPr lang="en-US" dirty="0"/>
+              <a:t> – returns an array containing Method objects which reflect all methods declared in a class</a:t>
+            </a:r>
+          </a:p>
+          <a:p>
+            <a:r>
+              <a:rPr lang="en-US" b="1" dirty="0" err="1"/>
+              <a:t>getMethod</a:t>
+            </a:r>
+            <a:r>
+              <a:rPr lang="en-US" dirty="0"/>
+              <a:t> - returns a method object that matches a given name and parameter list</a:t>
+            </a:r>
+          </a:p>
+          <a:p>
+            <a:r>
+              <a:rPr lang="en-US" b="1" dirty="0" err="1"/>
+              <a:t>getDeclaredFields</a:t>
+            </a:r>
+            <a:r>
+              <a:rPr lang="en-US" dirty="0"/>
+              <a:t> – returns an array containing Field objects which reflect all fields declared in a class.</a:t>
+            </a:r>
+          </a:p>
+        </p:txBody>
+      </p:sp>
+      <p:sp>
+        <p:nvSpPr>
+          <p:cNvPr id="4" name="Slide Number Placeholder 3">
+            <a:extLst>
+              <a:ext uri="{FF2B5EF4-FFF2-40B4-BE49-F238E27FC236}">
+                <a16:creationId xmlns:a16="http://schemas.microsoft.com/office/drawing/2014/main" id="{483A7CCD-D4F0-4527-9651-963B2389435E}"/>
+              </a:ext>
+            </a:extLst>
+          </p:cNvPr>
+          <p:cNvSpPr>
+            <a:spLocks noGrp="1"/>
+          </p:cNvSpPr>
+          <p:nvPr>
+            <p:ph type="sldNum" idx="12"/>
+          </p:nvPr>
+        </p:nvSpPr>
+        <p:spPr/>
+        <p:txBody>
+          <a:bodyPr/>
+          <a:lstStyle/>
+          <a:p>
+            <a:pPr marL="0" lvl="0" indent="0" algn="r" rtl="0">
+              <a:spcBef>
+                <a:spcPts val="0"/>
+              </a:spcBef>
+              <a:spcAft>
+                <a:spcPts val="0"/>
+              </a:spcAft>
+              <a:buNone/>
+            </a:pPr>
+            <a:fld id="{00000000-1234-1234-1234-123412341234}" type="slidenum">
+              <a:rPr lang="en-US" smtClean="0"/>
+              <a:t>10</a:t>
+            </a:fld>
+            <a:endParaRPr lang="en-US"/>
+          </a:p>
+        </p:txBody>
+      </p:sp>
+    </p:spTree>
+    <p:extLst>
+      <p:ext uri="{BB962C8B-B14F-4D97-AF65-F5344CB8AC3E}">
+        <p14:creationId xmlns:p14="http://schemas.microsoft.com/office/powerpoint/2010/main" val="1284339430"/>
+      </p:ext>
+    </p:extLst>
+  </p:cSld>
+  <p:clrMapOvr>
+    <a:masterClrMapping/>
+  </p:clrMapOvr>
+</p:sld>
+</file>
+
+<file path=ppt/slides/slide12.xml><?xml version="1.0" encoding="utf-8"?>
+<p:sld xmlns:a="http://schemas.openxmlformats.org/drawingml/2006/main" xmlns:r="http://schemas.openxmlformats.org/officeDocument/2006/relationships" xmlns:p="http://schemas.openxmlformats.org/presentationml/2006/main">
+  <p:cSld>
+    <p:spTree>
+      <p:nvGrpSpPr>
+        <p:cNvPr id="1" name=""/>
+        <p:cNvGrpSpPr/>
+        <p:nvPr/>
+      </p:nvGrpSpPr>
+      <p:grpSpPr>
+        <a:xfrm>
+          <a:off x="0" y="0"/>
+          <a:ext cx="0" cy="0"/>
+          <a:chOff x="0" y="0"/>
+          <a:chExt cx="0" cy="0"/>
+        </a:xfrm>
+      </p:grpSpPr>
+      <p:sp>
+        <p:nvSpPr>
+          <p:cNvPr id="2" name="Title 1">
+            <a:extLst>
+              <a:ext uri="{FF2B5EF4-FFF2-40B4-BE49-F238E27FC236}">
+                <a16:creationId xmlns:a16="http://schemas.microsoft.com/office/drawing/2014/main" id="{437930B4-E996-4435-B9F1-D407853E2C03}"/>
+              </a:ext>
+            </a:extLst>
+          </p:cNvPr>
+          <p:cNvSpPr>
+            <a:spLocks noGrp="1"/>
+          </p:cNvSpPr>
+          <p:nvPr>
+            <p:ph type="title"/>
+          </p:nvPr>
+        </p:nvSpPr>
+        <p:spPr/>
+        <p:txBody>
+          <a:bodyPr/>
+          <a:lstStyle/>
+          <a:p>
+            <a:r>
+              <a:rPr lang="en-US" dirty="0"/>
               <a:t>Constructor Features</a:t>
             </a:r>
           </a:p>
@@ -37143,7 +37550,7 @@
             </a:pPr>
             <a:fld id="{00000000-1234-1234-1234-123412341234}" type="slidenum">
               <a:rPr lang="en-US" smtClean="0"/>
-              <a:t>9</a:t>
+              <a:t>11</a:t>
             </a:fld>
             <a:endParaRPr lang="en-US"/>
           </a:p>
@@ -37162,7 +37569,7 @@
 </p:sld>
 </file>
 
-<file path=ppt/slides/slide11.xml><?xml version="1.0" encoding="utf-8"?>
+<file path=ppt/slides/slide13.xml><?xml version="1.0" encoding="utf-8"?>
 <p:sld xmlns:a="http://schemas.openxmlformats.org/drawingml/2006/main" xmlns:r="http://schemas.openxmlformats.org/officeDocument/2006/relationships" xmlns:p="http://schemas.openxmlformats.org/presentationml/2006/main">
   <p:cSld>
     <p:spTree>
@@ -37328,7 +37735,7 @@
             </a:pPr>
             <a:fld id="{00000000-1234-1234-1234-123412341234}" type="slidenum">
               <a:rPr lang="en-US" smtClean="0"/>
-              <a:t>10</a:t>
+              <a:t>12</a:t>
             </a:fld>
             <a:endParaRPr lang="en-US"/>
           </a:p>
@@ -37347,7 +37754,7 @@
 </p:sld>
 </file>
 
-<file path=ppt/slides/slide12.xml><?xml version="1.0" encoding="utf-8"?>
+<file path=ppt/slides/slide14.xml><?xml version="1.0" encoding="utf-8"?>
 <p:sld xmlns:a="http://schemas.openxmlformats.org/drawingml/2006/main" xmlns:r="http://schemas.openxmlformats.org/officeDocument/2006/relationships" xmlns:p="http://schemas.openxmlformats.org/presentationml/2006/main">
   <p:cSld>
     <p:spTree>
@@ -37531,7 +37938,7 @@
             </a:pPr>
             <a:fld id="{00000000-1234-1234-1234-123412341234}" type="slidenum">
               <a:rPr lang="en-US" smtClean="0"/>
-              <a:t>11</a:t>
+              <a:t>13</a:t>
             </a:fld>
             <a:endParaRPr lang="en-US"/>
           </a:p>
@@ -37550,7 +37957,7 @@
 </p:sld>
 </file>
 
-<file path=ppt/slides/slide13.xml><?xml version="1.0" encoding="utf-8"?>
+<file path=ppt/slides/slide15.xml><?xml version="1.0" encoding="utf-8"?>
 <p:sld xmlns:a="http://schemas.openxmlformats.org/drawingml/2006/main" xmlns:r="http://schemas.openxmlformats.org/officeDocument/2006/relationships" xmlns:p="http://schemas.openxmlformats.org/presentationml/2006/main">
   <p:cSld>
     <p:spTree>
@@ -37786,7 +38193,7 @@
             </a:pPr>
             <a:fld id="{00000000-1234-1234-1234-123412341234}" type="slidenum">
               <a:rPr lang="en-US" smtClean="0"/>
-              <a:t>12</a:t>
+              <a:t>14</a:t>
             </a:fld>
             <a:endParaRPr lang="en-US"/>
           </a:p>
@@ -37805,7 +38212,7 @@
 </p:sld>
 </file>
 
-<file path=ppt/slides/slide14.xml><?xml version="1.0" encoding="utf-8"?>
+<file path=ppt/slides/slide16.xml><?xml version="1.0" encoding="utf-8"?>
 <p:sld xmlns:a="http://schemas.openxmlformats.org/drawingml/2006/main" xmlns:r="http://schemas.openxmlformats.org/officeDocument/2006/relationships" xmlns:p="http://schemas.openxmlformats.org/presentationml/2006/main">
   <p:cSld>
     <p:spTree>
@@ -37941,7 +38348,7 @@
             </a:pPr>
             <a:fld id="{00000000-1234-1234-1234-123412341234}" type="slidenum">
               <a:rPr lang="en-US" smtClean="0"/>
-              <a:t>13</a:t>
+              <a:t>15</a:t>
             </a:fld>
             <a:endParaRPr lang="en-US"/>
           </a:p>
@@ -37960,7 +38367,7 @@
 </p:sld>
 </file>
 
-<file path=ppt/slides/slide15.xml><?xml version="1.0" encoding="utf-8"?>
+<file path=ppt/slides/slide17.xml><?xml version="1.0" encoding="utf-8"?>
 <p:sld xmlns:a="http://schemas.openxmlformats.org/drawingml/2006/main" xmlns:r="http://schemas.openxmlformats.org/officeDocument/2006/relationships" xmlns:p="http://schemas.openxmlformats.org/presentationml/2006/main">
   <p:cSld>
     <p:spTree>
@@ -38144,7 +38551,7 @@
             </a:pPr>
             <a:fld id="{00000000-1234-1234-1234-123412341234}" type="slidenum">
               <a:rPr lang="en-US" smtClean="0"/>
-              <a:t>14</a:t>
+              <a:t>16</a:t>
             </a:fld>
             <a:endParaRPr lang="en-US"/>
           </a:p>
@@ -38163,7 +38570,7 @@
 </p:sld>
 </file>
 
-<file path=ppt/slides/slide16.xml><?xml version="1.0" encoding="utf-8"?>
+<file path=ppt/slides/slide18.xml><?xml version="1.0" encoding="utf-8"?>
 <p:sld xmlns:a="http://schemas.openxmlformats.org/drawingml/2006/main" xmlns:r="http://schemas.openxmlformats.org/officeDocument/2006/relationships" xmlns:p="http://schemas.openxmlformats.org/presentationml/2006/main">
   <p:cSld>
     <p:spTree>
@@ -38267,7 +38674,7 @@
             </a:pPr>
             <a:fld id="{00000000-1234-1234-1234-123412341234}" type="slidenum">
               <a:rPr lang="en-US"/>
-              <a:t>15</a:t>
+              <a:t>17</a:t>
             </a:fld>
             <a:endParaRPr/>
           </a:p>
@@ -38455,6 +38862,328 @@
   <p:clrMapOvr>
     <a:masterClrMapping/>
   </p:clrMapOvr>
+  <p:timing>
+    <p:tnLst>
+      <p:par>
+        <p:cTn id="1" dur="indefinite" restart="never" nodeType="tmRoot">
+          <p:childTnLst>
+            <p:seq concurrent="1" nextAc="seek">
+              <p:cTn id="2" dur="indefinite" nodeType="mainSeq">
+                <p:childTnLst>
+                  <p:par>
+                    <p:cTn id="3" fill="hold">
+                      <p:stCondLst>
+                        <p:cond delay="indefinite"/>
+                      </p:stCondLst>
+                      <p:childTnLst>
+                        <p:par>
+                          <p:cTn id="4" fill="hold">
+                            <p:stCondLst>
+                              <p:cond delay="0"/>
+                            </p:stCondLst>
+                            <p:childTnLst>
+                              <p:par>
+                                <p:cTn id="5" presetID="1" presetClass="entr" presetSubtype="0" fill="hold" grpId="0" nodeType="clickEffect">
+                                  <p:stCondLst>
+                                    <p:cond delay="0"/>
+                                  </p:stCondLst>
+                                  <p:childTnLst>
+                                    <p:set>
+                                      <p:cBhvr>
+                                        <p:cTn id="6" dur="1" fill="hold">
+                                          <p:stCondLst>
+                                            <p:cond delay="0"/>
+                                          </p:stCondLst>
+                                        </p:cTn>
+                                        <p:tgtEl>
+                                          <p:spTgt spid="3">
+                                            <p:txEl>
+                                              <p:pRg st="0" end="0"/>
+                                            </p:txEl>
+                                          </p:spTgt>
+                                        </p:tgtEl>
+                                        <p:attrNameLst>
+                                          <p:attrName>style.visibility</p:attrName>
+                                        </p:attrNameLst>
+                                      </p:cBhvr>
+                                      <p:to>
+                                        <p:strVal val="visible"/>
+                                      </p:to>
+                                    </p:set>
+                                  </p:childTnLst>
+                                </p:cTn>
+                              </p:par>
+                            </p:childTnLst>
+                          </p:cTn>
+                        </p:par>
+                      </p:childTnLst>
+                    </p:cTn>
+                  </p:par>
+                  <p:par>
+                    <p:cTn id="7" fill="hold">
+                      <p:stCondLst>
+                        <p:cond delay="indefinite"/>
+                      </p:stCondLst>
+                      <p:childTnLst>
+                        <p:par>
+                          <p:cTn id="8" fill="hold">
+                            <p:stCondLst>
+                              <p:cond delay="0"/>
+                            </p:stCondLst>
+                            <p:childTnLst>
+                              <p:par>
+                                <p:cTn id="9" presetID="1" presetClass="entr" presetSubtype="0" fill="hold" grpId="0" nodeType="clickEffect">
+                                  <p:stCondLst>
+                                    <p:cond delay="0"/>
+                                  </p:stCondLst>
+                                  <p:childTnLst>
+                                    <p:set>
+                                      <p:cBhvr>
+                                        <p:cTn id="10" dur="1" fill="hold">
+                                          <p:stCondLst>
+                                            <p:cond delay="0"/>
+                                          </p:stCondLst>
+                                        </p:cTn>
+                                        <p:tgtEl>
+                                          <p:spTgt spid="3">
+                                            <p:txEl>
+                                              <p:pRg st="1" end="1"/>
+                                            </p:txEl>
+                                          </p:spTgt>
+                                        </p:tgtEl>
+                                        <p:attrNameLst>
+                                          <p:attrName>style.visibility</p:attrName>
+                                        </p:attrNameLst>
+                                      </p:cBhvr>
+                                      <p:to>
+                                        <p:strVal val="visible"/>
+                                      </p:to>
+                                    </p:set>
+                                  </p:childTnLst>
+                                </p:cTn>
+                              </p:par>
+                            </p:childTnLst>
+                          </p:cTn>
+                        </p:par>
+                      </p:childTnLst>
+                    </p:cTn>
+                  </p:par>
+                  <p:par>
+                    <p:cTn id="11" fill="hold">
+                      <p:stCondLst>
+                        <p:cond delay="indefinite"/>
+                      </p:stCondLst>
+                      <p:childTnLst>
+                        <p:par>
+                          <p:cTn id="12" fill="hold">
+                            <p:stCondLst>
+                              <p:cond delay="0"/>
+                            </p:stCondLst>
+                            <p:childTnLst>
+                              <p:par>
+                                <p:cTn id="13" presetID="1" presetClass="entr" presetSubtype="0" fill="hold" grpId="0" nodeType="clickEffect">
+                                  <p:stCondLst>
+                                    <p:cond delay="0"/>
+                                  </p:stCondLst>
+                                  <p:childTnLst>
+                                    <p:set>
+                                      <p:cBhvr>
+                                        <p:cTn id="14" dur="1" fill="hold">
+                                          <p:stCondLst>
+                                            <p:cond delay="0"/>
+                                          </p:stCondLst>
+                                        </p:cTn>
+                                        <p:tgtEl>
+                                          <p:spTgt spid="3">
+                                            <p:txEl>
+                                              <p:pRg st="2" end="2"/>
+                                            </p:txEl>
+                                          </p:spTgt>
+                                        </p:tgtEl>
+                                        <p:attrNameLst>
+                                          <p:attrName>style.visibility</p:attrName>
+                                        </p:attrNameLst>
+                                      </p:cBhvr>
+                                      <p:to>
+                                        <p:strVal val="visible"/>
+                                      </p:to>
+                                    </p:set>
+                                  </p:childTnLst>
+                                </p:cTn>
+                              </p:par>
+                              <p:par>
+                                <p:cTn id="15" presetID="1" presetClass="entr" presetSubtype="0" fill="hold" grpId="0" nodeType="withEffect">
+                                  <p:stCondLst>
+                                    <p:cond delay="0"/>
+                                  </p:stCondLst>
+                                  <p:childTnLst>
+                                    <p:set>
+                                      <p:cBhvr>
+                                        <p:cTn id="16" dur="1" fill="hold">
+                                          <p:stCondLst>
+                                            <p:cond delay="0"/>
+                                          </p:stCondLst>
+                                        </p:cTn>
+                                        <p:tgtEl>
+                                          <p:spTgt spid="3">
+                                            <p:txEl>
+                                              <p:pRg st="3" end="3"/>
+                                            </p:txEl>
+                                          </p:spTgt>
+                                        </p:tgtEl>
+                                        <p:attrNameLst>
+                                          <p:attrName>style.visibility</p:attrName>
+                                        </p:attrNameLst>
+                                      </p:cBhvr>
+                                      <p:to>
+                                        <p:strVal val="visible"/>
+                                      </p:to>
+                                    </p:set>
+                                  </p:childTnLst>
+                                </p:cTn>
+                              </p:par>
+                              <p:par>
+                                <p:cTn id="17" presetID="1" presetClass="entr" presetSubtype="0" fill="hold" grpId="0" nodeType="withEffect">
+                                  <p:stCondLst>
+                                    <p:cond delay="0"/>
+                                  </p:stCondLst>
+                                  <p:childTnLst>
+                                    <p:set>
+                                      <p:cBhvr>
+                                        <p:cTn id="18" dur="1" fill="hold">
+                                          <p:stCondLst>
+                                            <p:cond delay="0"/>
+                                          </p:stCondLst>
+                                        </p:cTn>
+                                        <p:tgtEl>
+                                          <p:spTgt spid="3">
+                                            <p:txEl>
+                                              <p:pRg st="4" end="4"/>
+                                            </p:txEl>
+                                          </p:spTgt>
+                                        </p:tgtEl>
+                                        <p:attrNameLst>
+                                          <p:attrName>style.visibility</p:attrName>
+                                        </p:attrNameLst>
+                                      </p:cBhvr>
+                                      <p:to>
+                                        <p:strVal val="visible"/>
+                                      </p:to>
+                                    </p:set>
+                                  </p:childTnLst>
+                                </p:cTn>
+                              </p:par>
+                              <p:par>
+                                <p:cTn id="19" presetID="1" presetClass="entr" presetSubtype="0" fill="hold" grpId="0" nodeType="withEffect">
+                                  <p:stCondLst>
+                                    <p:cond delay="0"/>
+                                  </p:stCondLst>
+                                  <p:childTnLst>
+                                    <p:set>
+                                      <p:cBhvr>
+                                        <p:cTn id="20" dur="1" fill="hold">
+                                          <p:stCondLst>
+                                            <p:cond delay="0"/>
+                                          </p:stCondLst>
+                                        </p:cTn>
+                                        <p:tgtEl>
+                                          <p:spTgt spid="3">
+                                            <p:txEl>
+                                              <p:pRg st="5" end="5"/>
+                                            </p:txEl>
+                                          </p:spTgt>
+                                        </p:tgtEl>
+                                        <p:attrNameLst>
+                                          <p:attrName>style.visibility</p:attrName>
+                                        </p:attrNameLst>
+                                      </p:cBhvr>
+                                      <p:to>
+                                        <p:strVal val="visible"/>
+                                      </p:to>
+                                    </p:set>
+                                  </p:childTnLst>
+                                </p:cTn>
+                              </p:par>
+                            </p:childTnLst>
+                          </p:cTn>
+                        </p:par>
+                      </p:childTnLst>
+                    </p:cTn>
+                  </p:par>
+                  <p:par>
+                    <p:cTn id="21" fill="hold">
+                      <p:stCondLst>
+                        <p:cond delay="indefinite"/>
+                      </p:stCondLst>
+                      <p:childTnLst>
+                        <p:par>
+                          <p:cTn id="22" fill="hold">
+                            <p:stCondLst>
+                              <p:cond delay="0"/>
+                            </p:stCondLst>
+                            <p:childTnLst>
+                              <p:par>
+                                <p:cTn id="23" presetID="1" presetClass="entr" presetSubtype="0" fill="hold" grpId="0" nodeType="clickEffect">
+                                  <p:stCondLst>
+                                    <p:cond delay="0"/>
+                                  </p:stCondLst>
+                                  <p:childTnLst>
+                                    <p:set>
+                                      <p:cBhvr>
+                                        <p:cTn id="24" dur="1" fill="hold">
+                                          <p:stCondLst>
+                                            <p:cond delay="0"/>
+                                          </p:stCondLst>
+                                        </p:cTn>
+                                        <p:tgtEl>
+                                          <p:spTgt spid="3">
+                                            <p:txEl>
+                                              <p:pRg st="6" end="6"/>
+                                            </p:txEl>
+                                          </p:spTgt>
+                                        </p:tgtEl>
+                                        <p:attrNameLst>
+                                          <p:attrName>style.visibility</p:attrName>
+                                        </p:attrNameLst>
+                                      </p:cBhvr>
+                                      <p:to>
+                                        <p:strVal val="visible"/>
+                                      </p:to>
+                                    </p:set>
+                                  </p:childTnLst>
+                                </p:cTn>
+                              </p:par>
+                            </p:childTnLst>
+                          </p:cTn>
+                        </p:par>
+                      </p:childTnLst>
+                    </p:cTn>
+                  </p:par>
+                </p:childTnLst>
+              </p:cTn>
+              <p:prevCondLst>
+                <p:cond evt="onPrev" delay="0">
+                  <p:tgtEl>
+                    <p:sldTgt/>
+                  </p:tgtEl>
+                </p:cond>
+              </p:prevCondLst>
+              <p:nextCondLst>
+                <p:cond evt="onNext" delay="0">
+                  <p:tgtEl>
+                    <p:sldTgt/>
+                  </p:tgtEl>
+                </p:cond>
+              </p:nextCondLst>
+            </p:seq>
+          </p:childTnLst>
+        </p:cTn>
+      </p:par>
+    </p:tnLst>
+    <p:bldLst>
+      <p:bldP spid="3" grpId="0" build="p"/>
+    </p:bldLst>
+  </p:timing>
 </p:sld>
 </file>
 
@@ -38533,7 +39262,7 @@
           <a:p>
             <a:r>
               <a:rPr lang="en-US" dirty="0"/>
-              <a:t>The Lambda expression is one of the biggest new features of Java 8, and introduces aspects important to the use of functional programming in java.</a:t>
+              <a:t>The Lambda expression is one of the biggest new features of Java 8, introducing aspects important to the use of functional programming in java.</a:t>
             </a:r>
           </a:p>
           <a:p>
@@ -38610,6 +39339,199 @@
   <p:clrMapOvr>
     <a:masterClrMapping/>
   </p:clrMapOvr>
+  <p:timing>
+    <p:tnLst>
+      <p:par>
+        <p:cTn id="1" dur="indefinite" restart="never" nodeType="tmRoot">
+          <p:childTnLst>
+            <p:seq concurrent="1" nextAc="seek">
+              <p:cTn id="2" dur="indefinite" nodeType="mainSeq">
+                <p:childTnLst>
+                  <p:par>
+                    <p:cTn id="3" fill="hold">
+                      <p:stCondLst>
+                        <p:cond delay="indefinite"/>
+                      </p:stCondLst>
+                      <p:childTnLst>
+                        <p:par>
+                          <p:cTn id="4" fill="hold">
+                            <p:stCondLst>
+                              <p:cond delay="0"/>
+                            </p:stCondLst>
+                            <p:childTnLst>
+                              <p:par>
+                                <p:cTn id="5" presetID="1" presetClass="entr" presetSubtype="0" fill="hold" grpId="0" nodeType="clickEffect">
+                                  <p:stCondLst>
+                                    <p:cond delay="0"/>
+                                  </p:stCondLst>
+                                  <p:childTnLst>
+                                    <p:set>
+                                      <p:cBhvr>
+                                        <p:cTn id="6" dur="1" fill="hold">
+                                          <p:stCondLst>
+                                            <p:cond delay="0"/>
+                                          </p:stCondLst>
+                                        </p:cTn>
+                                        <p:tgtEl>
+                                          <p:spTgt spid="3">
+                                            <p:txEl>
+                                              <p:pRg st="0" end="0"/>
+                                            </p:txEl>
+                                          </p:spTgt>
+                                        </p:tgtEl>
+                                        <p:attrNameLst>
+                                          <p:attrName>style.visibility</p:attrName>
+                                        </p:attrNameLst>
+                                      </p:cBhvr>
+                                      <p:to>
+                                        <p:strVal val="visible"/>
+                                      </p:to>
+                                    </p:set>
+                                  </p:childTnLst>
+                                </p:cTn>
+                              </p:par>
+                              <p:par>
+                                <p:cTn id="7" presetID="1" presetClass="entr" presetSubtype="0" fill="hold" grpId="0" nodeType="withEffect">
+                                  <p:stCondLst>
+                                    <p:cond delay="0"/>
+                                  </p:stCondLst>
+                                  <p:childTnLst>
+                                    <p:set>
+                                      <p:cBhvr>
+                                        <p:cTn id="8" dur="1" fill="hold">
+                                          <p:stCondLst>
+                                            <p:cond delay="0"/>
+                                          </p:stCondLst>
+                                        </p:cTn>
+                                        <p:tgtEl>
+                                          <p:spTgt spid="3">
+                                            <p:txEl>
+                                              <p:pRg st="1" end="1"/>
+                                            </p:txEl>
+                                          </p:spTgt>
+                                        </p:tgtEl>
+                                        <p:attrNameLst>
+                                          <p:attrName>style.visibility</p:attrName>
+                                        </p:attrNameLst>
+                                      </p:cBhvr>
+                                      <p:to>
+                                        <p:strVal val="visible"/>
+                                      </p:to>
+                                    </p:set>
+                                  </p:childTnLst>
+                                </p:cTn>
+                              </p:par>
+                            </p:childTnLst>
+                          </p:cTn>
+                        </p:par>
+                      </p:childTnLst>
+                    </p:cTn>
+                  </p:par>
+                  <p:par>
+                    <p:cTn id="9" fill="hold">
+                      <p:stCondLst>
+                        <p:cond delay="indefinite"/>
+                      </p:stCondLst>
+                      <p:childTnLst>
+                        <p:par>
+                          <p:cTn id="10" fill="hold">
+                            <p:stCondLst>
+                              <p:cond delay="0"/>
+                            </p:stCondLst>
+                            <p:childTnLst>
+                              <p:par>
+                                <p:cTn id="11" presetID="1" presetClass="entr" presetSubtype="0" fill="hold" grpId="0" nodeType="clickEffect">
+                                  <p:stCondLst>
+                                    <p:cond delay="0"/>
+                                  </p:stCondLst>
+                                  <p:childTnLst>
+                                    <p:set>
+                                      <p:cBhvr>
+                                        <p:cTn id="12" dur="1" fill="hold">
+                                          <p:stCondLst>
+                                            <p:cond delay="0"/>
+                                          </p:stCondLst>
+                                        </p:cTn>
+                                        <p:tgtEl>
+                                          <p:spTgt spid="3">
+                                            <p:txEl>
+                                              <p:pRg st="2" end="2"/>
+                                            </p:txEl>
+                                          </p:spTgt>
+                                        </p:tgtEl>
+                                        <p:attrNameLst>
+                                          <p:attrName>style.visibility</p:attrName>
+                                        </p:attrNameLst>
+                                      </p:cBhvr>
+                                      <p:to>
+                                        <p:strVal val="visible"/>
+                                      </p:to>
+                                    </p:set>
+                                  </p:childTnLst>
+                                </p:cTn>
+                              </p:par>
+                              <p:par>
+                                <p:cTn id="13" presetID="1" presetClass="entr" presetSubtype="0" fill="hold" grpId="0" nodeType="withEffect">
+                                  <p:stCondLst>
+                                    <p:cond delay="0"/>
+                                  </p:stCondLst>
+                                  <p:childTnLst>
+                                    <p:set>
+                                      <p:cBhvr>
+                                        <p:cTn id="14" dur="1" fill="hold">
+                                          <p:stCondLst>
+                                            <p:cond delay="0"/>
+                                          </p:stCondLst>
+                                        </p:cTn>
+                                        <p:tgtEl>
+                                          <p:spTgt spid="3">
+                                            <p:txEl>
+                                              <p:pRg st="3" end="3"/>
+                                            </p:txEl>
+                                          </p:spTgt>
+                                        </p:tgtEl>
+                                        <p:attrNameLst>
+                                          <p:attrName>style.visibility</p:attrName>
+                                        </p:attrNameLst>
+                                      </p:cBhvr>
+                                      <p:to>
+                                        <p:strVal val="visible"/>
+                                      </p:to>
+                                    </p:set>
+                                  </p:childTnLst>
+                                </p:cTn>
+                              </p:par>
+                            </p:childTnLst>
+                          </p:cTn>
+                        </p:par>
+                      </p:childTnLst>
+                    </p:cTn>
+                  </p:par>
+                </p:childTnLst>
+              </p:cTn>
+              <p:prevCondLst>
+                <p:cond evt="onPrev" delay="0">
+                  <p:tgtEl>
+                    <p:sldTgt/>
+                  </p:tgtEl>
+                </p:cond>
+              </p:prevCondLst>
+              <p:nextCondLst>
+                <p:cond evt="onNext" delay="0">
+                  <p:tgtEl>
+                    <p:sldTgt/>
+                  </p:tgtEl>
+                </p:cond>
+              </p:nextCondLst>
+            </p:seq>
+          </p:childTnLst>
+        </p:cTn>
+      </p:par>
+    </p:tnLst>
+    <p:bldLst>
+      <p:bldP spid="3" grpId="0" build="p"/>
+    </p:bldLst>
+  </p:timing>
 </p:sld>
 </file>
 
@@ -39253,6 +40175,275 @@
   <p:clrMapOvr>
     <a:masterClrMapping/>
   </p:clrMapOvr>
+  <p:timing>
+    <p:tnLst>
+      <p:par>
+        <p:cTn id="1" dur="indefinite" restart="never" nodeType="tmRoot">
+          <p:childTnLst>
+            <p:seq concurrent="1" nextAc="seek">
+              <p:cTn id="2" dur="indefinite" nodeType="mainSeq">
+                <p:childTnLst>
+                  <p:par>
+                    <p:cTn id="3" fill="hold">
+                      <p:stCondLst>
+                        <p:cond delay="indefinite"/>
+                      </p:stCondLst>
+                      <p:childTnLst>
+                        <p:par>
+                          <p:cTn id="4" fill="hold">
+                            <p:stCondLst>
+                              <p:cond delay="0"/>
+                            </p:stCondLst>
+                            <p:childTnLst>
+                              <p:par>
+                                <p:cTn id="5" presetID="1" presetClass="entr" presetSubtype="0" fill="hold" grpId="0" nodeType="clickEffect">
+                                  <p:stCondLst>
+                                    <p:cond delay="0"/>
+                                  </p:stCondLst>
+                                  <p:childTnLst>
+                                    <p:set>
+                                      <p:cBhvr>
+                                        <p:cTn id="6" dur="1" fill="hold">
+                                          <p:stCondLst>
+                                            <p:cond delay="0"/>
+                                          </p:stCondLst>
+                                        </p:cTn>
+                                        <p:tgtEl>
+                                          <p:spTgt spid="3">
+                                            <p:txEl>
+                                              <p:pRg st="0" end="0"/>
+                                            </p:txEl>
+                                          </p:spTgt>
+                                        </p:tgtEl>
+                                        <p:attrNameLst>
+                                          <p:attrName>style.visibility</p:attrName>
+                                        </p:attrNameLst>
+                                      </p:cBhvr>
+                                      <p:to>
+                                        <p:strVal val="visible"/>
+                                      </p:to>
+                                    </p:set>
+                                  </p:childTnLst>
+                                </p:cTn>
+                              </p:par>
+                            </p:childTnLst>
+                          </p:cTn>
+                        </p:par>
+                      </p:childTnLst>
+                    </p:cTn>
+                  </p:par>
+                  <p:par>
+                    <p:cTn id="7" fill="hold">
+                      <p:stCondLst>
+                        <p:cond delay="indefinite"/>
+                      </p:stCondLst>
+                      <p:childTnLst>
+                        <p:par>
+                          <p:cTn id="8" fill="hold">
+                            <p:stCondLst>
+                              <p:cond delay="0"/>
+                            </p:stCondLst>
+                            <p:childTnLst>
+                              <p:par>
+                                <p:cTn id="9" presetID="1" presetClass="entr" presetSubtype="0" fill="hold" grpId="0" nodeType="clickEffect">
+                                  <p:stCondLst>
+                                    <p:cond delay="0"/>
+                                  </p:stCondLst>
+                                  <p:childTnLst>
+                                    <p:set>
+                                      <p:cBhvr>
+                                        <p:cTn id="10" dur="1" fill="hold">
+                                          <p:stCondLst>
+                                            <p:cond delay="0"/>
+                                          </p:stCondLst>
+                                        </p:cTn>
+                                        <p:tgtEl>
+                                          <p:spTgt spid="3">
+                                            <p:txEl>
+                                              <p:pRg st="1" end="1"/>
+                                            </p:txEl>
+                                          </p:spTgt>
+                                        </p:tgtEl>
+                                        <p:attrNameLst>
+                                          <p:attrName>style.visibility</p:attrName>
+                                        </p:attrNameLst>
+                                      </p:cBhvr>
+                                      <p:to>
+                                        <p:strVal val="visible"/>
+                                      </p:to>
+                                    </p:set>
+                                  </p:childTnLst>
+                                </p:cTn>
+                              </p:par>
+                            </p:childTnLst>
+                          </p:cTn>
+                        </p:par>
+                      </p:childTnLst>
+                    </p:cTn>
+                  </p:par>
+                  <p:par>
+                    <p:cTn id="11" fill="hold">
+                      <p:stCondLst>
+                        <p:cond delay="indefinite"/>
+                      </p:stCondLst>
+                      <p:childTnLst>
+                        <p:par>
+                          <p:cTn id="12" fill="hold">
+                            <p:stCondLst>
+                              <p:cond delay="0"/>
+                            </p:stCondLst>
+                            <p:childTnLst>
+                              <p:par>
+                                <p:cTn id="13" presetID="1" presetClass="entr" presetSubtype="0" fill="hold" grpId="0" nodeType="clickEffect">
+                                  <p:stCondLst>
+                                    <p:cond delay="0"/>
+                                  </p:stCondLst>
+                                  <p:childTnLst>
+                                    <p:set>
+                                      <p:cBhvr>
+                                        <p:cTn id="14" dur="1" fill="hold">
+                                          <p:stCondLst>
+                                            <p:cond delay="0"/>
+                                          </p:stCondLst>
+                                        </p:cTn>
+                                        <p:tgtEl>
+                                          <p:spTgt spid="5"/>
+                                        </p:tgtEl>
+                                        <p:attrNameLst>
+                                          <p:attrName>style.visibility</p:attrName>
+                                        </p:attrNameLst>
+                                      </p:cBhvr>
+                                      <p:to>
+                                        <p:strVal val="visible"/>
+                                      </p:to>
+                                    </p:set>
+                                  </p:childTnLst>
+                                </p:cTn>
+                              </p:par>
+                            </p:childTnLst>
+                          </p:cTn>
+                        </p:par>
+                      </p:childTnLst>
+                    </p:cTn>
+                  </p:par>
+                  <p:par>
+                    <p:cTn id="15" fill="hold">
+                      <p:stCondLst>
+                        <p:cond delay="indefinite"/>
+                      </p:stCondLst>
+                      <p:childTnLst>
+                        <p:par>
+                          <p:cTn id="16" fill="hold">
+                            <p:stCondLst>
+                              <p:cond delay="0"/>
+                            </p:stCondLst>
+                            <p:childTnLst>
+                              <p:par>
+                                <p:cTn id="17" presetID="1" presetClass="entr" presetSubtype="0" fill="hold" grpId="0" nodeType="clickEffect">
+                                  <p:stCondLst>
+                                    <p:cond delay="0"/>
+                                  </p:stCondLst>
+                                  <p:childTnLst>
+                                    <p:set>
+                                      <p:cBhvr>
+                                        <p:cTn id="18" dur="1" fill="hold">
+                                          <p:stCondLst>
+                                            <p:cond delay="0"/>
+                                          </p:stCondLst>
+                                        </p:cTn>
+                                        <p:tgtEl>
+                                          <p:spTgt spid="6"/>
+                                        </p:tgtEl>
+                                        <p:attrNameLst>
+                                          <p:attrName>style.visibility</p:attrName>
+                                        </p:attrNameLst>
+                                      </p:cBhvr>
+                                      <p:to>
+                                        <p:strVal val="visible"/>
+                                      </p:to>
+                                    </p:set>
+                                  </p:childTnLst>
+                                </p:cTn>
+                              </p:par>
+                            </p:childTnLst>
+                          </p:cTn>
+                        </p:par>
+                      </p:childTnLst>
+                    </p:cTn>
+                  </p:par>
+                  <p:par>
+                    <p:cTn id="19" fill="hold">
+                      <p:stCondLst>
+                        <p:cond delay="indefinite"/>
+                      </p:stCondLst>
+                      <p:childTnLst>
+                        <p:par>
+                          <p:cTn id="20" fill="hold">
+                            <p:stCondLst>
+                              <p:cond delay="0"/>
+                            </p:stCondLst>
+                            <p:childTnLst>
+                              <p:par>
+                                <p:cTn id="21" presetID="1" presetClass="entr" presetSubtype="0" fill="hold" grpId="0" nodeType="clickEffect">
+                                  <p:stCondLst>
+                                    <p:cond delay="0"/>
+                                  </p:stCondLst>
+                                  <p:childTnLst>
+                                    <p:set>
+                                      <p:cBhvr>
+                                        <p:cTn id="22" dur="1" fill="hold">
+                                          <p:stCondLst>
+                                            <p:cond delay="0"/>
+                                          </p:stCondLst>
+                                        </p:cTn>
+                                        <p:tgtEl>
+                                          <p:spTgt spid="9"/>
+                                        </p:tgtEl>
+                                        <p:attrNameLst>
+                                          <p:attrName>style.visibility</p:attrName>
+                                        </p:attrNameLst>
+                                      </p:cBhvr>
+                                      <p:to>
+                                        <p:strVal val="visible"/>
+                                      </p:to>
+                                    </p:set>
+                                  </p:childTnLst>
+                                </p:cTn>
+                              </p:par>
+                            </p:childTnLst>
+                          </p:cTn>
+                        </p:par>
+                      </p:childTnLst>
+                    </p:cTn>
+                  </p:par>
+                </p:childTnLst>
+              </p:cTn>
+              <p:prevCondLst>
+                <p:cond evt="onPrev" delay="0">
+                  <p:tgtEl>
+                    <p:sldTgt/>
+                  </p:tgtEl>
+                </p:cond>
+              </p:prevCondLst>
+              <p:nextCondLst>
+                <p:cond evt="onNext" delay="0">
+                  <p:tgtEl>
+                    <p:sldTgt/>
+                  </p:tgtEl>
+                </p:cond>
+              </p:nextCondLst>
+            </p:seq>
+          </p:childTnLst>
+        </p:cTn>
+      </p:par>
+    </p:tnLst>
+    <p:bldLst>
+      <p:bldP spid="3" grpId="0" build="p"/>
+      <p:bldP spid="5" grpId="0" animBg="1"/>
+      <p:bldP spid="6" grpId="0"/>
+      <p:bldP spid="9" grpId="0" animBg="1"/>
+    </p:bldLst>
+  </p:timing>
 </p:sld>
 </file>
 
@@ -39324,23 +40515,18 @@
           </a:xfrm>
         </p:spPr>
         <p:txBody>
-          <a:bodyPr>
+          <a:bodyPr anchor="ctr">
             <a:normAutofit/>
           </a:bodyPr>
           <a:lstStyle/>
           <a:p>
             <a:r>
               <a:rPr lang="en-US" dirty="0"/>
-              <a:t>Lambda expressions in Java </a:t>
+              <a:t>Lambda expressions in Java are only* usable with functional interfaces.</a:t>
             </a:r>
-            <a:r>
-              <a:rPr lang="en-US"/>
-              <a:t>are only* </a:t>
-            </a:r>
-            <a:r>
-              <a:rPr lang="en-US" dirty="0"/>
-              <a:t>usable with functional interfaces.</a:t>
-            </a:r>
+          </a:p>
+          <a:p>
+            <a:endParaRPr lang="en-US" dirty="0"/>
           </a:p>
           <a:p>
             <a:r>
@@ -39808,7 +40994,17 @@
                 <a:latin typeface="Courier New" panose="02070309020205020404" pitchFamily="49" charset="0"/>
                 <a:cs typeface="Courier New" panose="02070309020205020404" pitchFamily="49" charset="0"/>
               </a:rPr>
-              <a:t>”); };</a:t>
+              <a:t>”); </a:t>
+            </a:r>
+          </a:p>
+          <a:p>
+            <a:pPr defTabSz="228600"/>
+            <a:r>
+              <a:rPr lang="en-US" sz="2000" b="1" dirty="0">
+                <a:latin typeface="Courier New" panose="02070309020205020404" pitchFamily="49" charset="0"/>
+                <a:cs typeface="Courier New" panose="02070309020205020404" pitchFamily="49" charset="0"/>
+              </a:rPr>
+              <a:t>   };</a:t>
             </a:r>
           </a:p>
           <a:p>
@@ -39889,6 +41085,792 @@
 </file>
 
 <file path=ppt/slides/slide7.xml><?xml version="1.0" encoding="utf-8"?>
+<p:sld xmlns:a="http://schemas.openxmlformats.org/drawingml/2006/main" xmlns:r="http://schemas.openxmlformats.org/officeDocument/2006/relationships" xmlns:p="http://schemas.openxmlformats.org/presentationml/2006/main">
+  <p:cSld>
+    <p:spTree>
+      <p:nvGrpSpPr>
+        <p:cNvPr id="1" name=""/>
+        <p:cNvGrpSpPr/>
+        <p:nvPr/>
+      </p:nvGrpSpPr>
+      <p:grpSpPr>
+        <a:xfrm>
+          <a:off x="0" y="0"/>
+          <a:ext cx="0" cy="0"/>
+          <a:chOff x="0" y="0"/>
+          <a:chExt cx="0" cy="0"/>
+        </a:xfrm>
+      </p:grpSpPr>
+      <p:sp>
+        <p:nvSpPr>
+          <p:cNvPr id="2" name="Title 1">
+            <a:extLst>
+              <a:ext uri="{FF2B5EF4-FFF2-40B4-BE49-F238E27FC236}">
+                <a16:creationId xmlns:a16="http://schemas.microsoft.com/office/drawing/2014/main" id="{164ECBC7-9B34-4C16-9C41-05516CACAF62}"/>
+              </a:ext>
+            </a:extLst>
+          </p:cNvPr>
+          <p:cNvSpPr>
+            <a:spLocks noGrp="1"/>
+          </p:cNvSpPr>
+          <p:nvPr>
+            <p:ph type="title"/>
+          </p:nvPr>
+        </p:nvSpPr>
+        <p:spPr/>
+        <p:txBody>
+          <a:bodyPr/>
+          <a:lstStyle/>
+          <a:p>
+            <a:r>
+              <a:rPr lang="en-US" dirty="0"/>
+              <a:t>Stream API</a:t>
+            </a:r>
+          </a:p>
+        </p:txBody>
+      </p:sp>
+      <p:sp>
+        <p:nvSpPr>
+          <p:cNvPr id="3" name="Content Placeholder 2">
+            <a:extLst>
+              <a:ext uri="{FF2B5EF4-FFF2-40B4-BE49-F238E27FC236}">
+                <a16:creationId xmlns:a16="http://schemas.microsoft.com/office/drawing/2014/main" id="{94DDA948-346B-454B-ABEA-5F518BEB9A83}"/>
+              </a:ext>
+            </a:extLst>
+          </p:cNvPr>
+          <p:cNvSpPr>
+            <a:spLocks noGrp="1"/>
+          </p:cNvSpPr>
+          <p:nvPr>
+            <p:ph idx="1"/>
+          </p:nvPr>
+        </p:nvSpPr>
+        <p:spPr/>
+        <p:txBody>
+          <a:bodyPr/>
+          <a:lstStyle/>
+          <a:p>
+            <a:r>
+              <a:rPr lang="en-US" dirty="0"/>
+              <a:t>The Stream API allows you to easily convert collections of objects to streams to allow the contents to be processed as such. </a:t>
+            </a:r>
+          </a:p>
+          <a:p>
+            <a:r>
+              <a:rPr lang="en-US" i="1" dirty="0" err="1"/>
+              <a:t>referenceToCollection.stream</a:t>
+            </a:r>
+            <a:r>
+              <a:rPr lang="en-US" i="1" dirty="0"/>
+              <a:t>()</a:t>
+            </a:r>
+            <a:br>
+              <a:rPr lang="en-US" i="1" dirty="0"/>
+            </a:br>
+            <a:r>
+              <a:rPr lang="en-US" i="1" dirty="0"/>
+              <a:t>    .</a:t>
+            </a:r>
+            <a:r>
+              <a:rPr lang="en-US" i="1" dirty="0" err="1"/>
+              <a:t>methodsToProcessCollection</a:t>
+            </a:r>
+            <a:r>
+              <a:rPr lang="en-US" i="1" dirty="0"/>
+              <a:t>()</a:t>
+            </a:r>
+            <a:br>
+              <a:rPr lang="en-US" i="1" dirty="0"/>
+            </a:br>
+            <a:r>
+              <a:rPr lang="en-US" i="1" dirty="0"/>
+              <a:t>    .</a:t>
+            </a:r>
+            <a:r>
+              <a:rPr lang="en-US" i="1" dirty="0" err="1"/>
+              <a:t>methodsToPrepareResult</a:t>
+            </a:r>
+            <a:r>
+              <a:rPr lang="en-US" i="1" dirty="0"/>
+              <a:t>();</a:t>
+            </a:r>
+          </a:p>
+          <a:p>
+            <a:r>
+              <a:rPr lang="en-US" i="1" dirty="0"/>
+              <a:t>map(), filter(), sorted()</a:t>
+            </a:r>
+          </a:p>
+          <a:p>
+            <a:r>
+              <a:rPr lang="en-US" i="1" dirty="0"/>
+              <a:t>reduce(), collect(), </a:t>
+            </a:r>
+            <a:r>
+              <a:rPr lang="en-US" i="1" dirty="0" err="1"/>
+              <a:t>forEach</a:t>
+            </a:r>
+            <a:r>
+              <a:rPr lang="en-US" i="1" dirty="0"/>
+              <a:t>() </a:t>
+            </a:r>
+          </a:p>
+        </p:txBody>
+      </p:sp>
+      <p:sp>
+        <p:nvSpPr>
+          <p:cNvPr id="4" name="Slide Number Placeholder 3">
+            <a:extLst>
+              <a:ext uri="{FF2B5EF4-FFF2-40B4-BE49-F238E27FC236}">
+                <a16:creationId xmlns:a16="http://schemas.microsoft.com/office/drawing/2014/main" id="{84EA10C4-406D-4489-B237-D913B89C4D9C}"/>
+              </a:ext>
+            </a:extLst>
+          </p:cNvPr>
+          <p:cNvSpPr>
+            <a:spLocks noGrp="1"/>
+          </p:cNvSpPr>
+          <p:nvPr>
+            <p:ph type="sldNum" sz="quarter" idx="12"/>
+          </p:nvPr>
+        </p:nvSpPr>
+        <p:spPr/>
+        <p:txBody>
+          <a:bodyPr/>
+          <a:lstStyle/>
+          <a:p>
+            <a:fld id="{F6728BC2-ACA3-447C-A909-F3F49211C066}" type="slidenum">
+              <a:rPr lang="en-US" smtClean="0"/>
+              <a:pPr/>
+              <a:t>6</a:t>
+            </a:fld>
+            <a:endParaRPr lang="en-US" dirty="0"/>
+          </a:p>
+        </p:txBody>
+      </p:sp>
+    </p:spTree>
+    <p:extLst>
+      <p:ext uri="{BB962C8B-B14F-4D97-AF65-F5344CB8AC3E}">
+        <p14:creationId xmlns:p14="http://schemas.microsoft.com/office/powerpoint/2010/main" val="3707808183"/>
+      </p:ext>
+    </p:extLst>
+  </p:cSld>
+  <p:clrMapOvr>
+    <a:masterClrMapping/>
+  </p:clrMapOvr>
+</p:sld>
+</file>
+
+<file path=ppt/slides/slide8.xml><?xml version="1.0" encoding="utf-8"?>
+<p:sld xmlns:a="http://schemas.openxmlformats.org/drawingml/2006/main" xmlns:r="http://schemas.openxmlformats.org/officeDocument/2006/relationships" xmlns:p="http://schemas.openxmlformats.org/presentationml/2006/main">
+  <p:cSld>
+    <p:spTree>
+      <p:nvGrpSpPr>
+        <p:cNvPr id="1" name=""/>
+        <p:cNvGrpSpPr/>
+        <p:nvPr/>
+      </p:nvGrpSpPr>
+      <p:grpSpPr>
+        <a:xfrm>
+          <a:off x="0" y="0"/>
+          <a:ext cx="0" cy="0"/>
+          <a:chOff x="0" y="0"/>
+          <a:chExt cx="0" cy="0"/>
+        </a:xfrm>
+      </p:grpSpPr>
+      <p:sp>
+        <p:nvSpPr>
+          <p:cNvPr id="2" name="Title 1">
+            <a:extLst>
+              <a:ext uri="{FF2B5EF4-FFF2-40B4-BE49-F238E27FC236}">
+                <a16:creationId xmlns:a16="http://schemas.microsoft.com/office/drawing/2014/main" id="{515820FD-36E9-44A9-BACD-302BB85118AD}"/>
+              </a:ext>
+            </a:extLst>
+          </p:cNvPr>
+          <p:cNvSpPr>
+            <a:spLocks noGrp="1"/>
+          </p:cNvSpPr>
+          <p:nvPr>
+            <p:ph type="title"/>
+          </p:nvPr>
+        </p:nvSpPr>
+        <p:spPr/>
+        <p:txBody>
+          <a:bodyPr/>
+          <a:lstStyle/>
+          <a:p>
+            <a:r>
+              <a:rPr lang="en-US" dirty="0"/>
+              <a:t>Stream Examples</a:t>
+            </a:r>
+          </a:p>
+        </p:txBody>
+      </p:sp>
+      <p:sp>
+        <p:nvSpPr>
+          <p:cNvPr id="3" name="Content Placeholder 2">
+            <a:extLst>
+              <a:ext uri="{FF2B5EF4-FFF2-40B4-BE49-F238E27FC236}">
+                <a16:creationId xmlns:a16="http://schemas.microsoft.com/office/drawing/2014/main" id="{A9119308-B89C-471B-BFE6-CA57ABFAF88A}"/>
+              </a:ext>
+            </a:extLst>
+          </p:cNvPr>
+          <p:cNvSpPr>
+            <a:spLocks noGrp="1"/>
+          </p:cNvSpPr>
+          <p:nvPr>
+            <p:ph idx="1"/>
+          </p:nvPr>
+        </p:nvSpPr>
+        <p:spPr/>
+        <p:txBody>
+          <a:bodyPr/>
+          <a:lstStyle/>
+          <a:p>
+            <a:endParaRPr lang="en-US" dirty="0"/>
+          </a:p>
+        </p:txBody>
+      </p:sp>
+      <p:sp>
+        <p:nvSpPr>
+          <p:cNvPr id="4" name="Slide Number Placeholder 3">
+            <a:extLst>
+              <a:ext uri="{FF2B5EF4-FFF2-40B4-BE49-F238E27FC236}">
+                <a16:creationId xmlns:a16="http://schemas.microsoft.com/office/drawing/2014/main" id="{D35D78CE-C97A-4456-83C9-42C0A3A5CD8F}"/>
+              </a:ext>
+            </a:extLst>
+          </p:cNvPr>
+          <p:cNvSpPr>
+            <a:spLocks noGrp="1"/>
+          </p:cNvSpPr>
+          <p:nvPr>
+            <p:ph type="sldNum" sz="quarter" idx="12"/>
+          </p:nvPr>
+        </p:nvSpPr>
+        <p:spPr/>
+        <p:txBody>
+          <a:bodyPr/>
+          <a:lstStyle/>
+          <a:p>
+            <a:fld id="{F6728BC2-ACA3-447C-A909-F3F49211C066}" type="slidenum">
+              <a:rPr lang="en-US" smtClean="0"/>
+              <a:pPr/>
+              <a:t>7</a:t>
+            </a:fld>
+            <a:endParaRPr lang="en-US" dirty="0"/>
+          </a:p>
+        </p:txBody>
+      </p:sp>
+      <p:sp>
+        <p:nvSpPr>
+          <p:cNvPr id="5" name="Rectangle 4">
+            <a:extLst>
+              <a:ext uri="{FF2B5EF4-FFF2-40B4-BE49-F238E27FC236}">
+                <a16:creationId xmlns:a16="http://schemas.microsoft.com/office/drawing/2014/main" id="{443BD423-9ADE-421C-A612-105B76C5A426}"/>
+              </a:ext>
+            </a:extLst>
+          </p:cNvPr>
+          <p:cNvSpPr/>
+          <p:nvPr/>
+        </p:nvSpPr>
+        <p:spPr>
+          <a:xfrm>
+            <a:off x="380010" y="1481447"/>
+            <a:ext cx="8604418" cy="4882266"/>
+          </a:xfrm>
+          <a:prstGeom prst="rect">
+            <a:avLst/>
+          </a:prstGeom>
+        </p:spPr>
+        <p:style>
+          <a:lnRef idx="1">
+            <a:schemeClr val="accent2"/>
+          </a:lnRef>
+          <a:fillRef idx="2">
+            <a:schemeClr val="accent2"/>
+          </a:fillRef>
+          <a:effectRef idx="1">
+            <a:schemeClr val="accent2"/>
+          </a:effectRef>
+          <a:fontRef idx="minor">
+            <a:schemeClr val="dk1"/>
+          </a:fontRef>
+        </p:style>
+        <p:txBody>
+          <a:bodyPr rtlCol="0" anchor="ctr">
+            <a:normAutofit/>
+          </a:bodyPr>
+          <a:lstStyle/>
+          <a:p>
+            <a:pPr algn="l"/>
+            <a:r>
+              <a:rPr lang="en-US" sz="1800" b="1" dirty="0">
+                <a:solidFill>
+                  <a:srgbClr val="7F0055"/>
+                </a:solidFill>
+                <a:latin typeface="Consolas" panose="020B0609020204030204" pitchFamily="49" charset="0"/>
+              </a:rPr>
+              <a:t>import</a:t>
+            </a:r>
+            <a:r>
+              <a:rPr lang="en-US" sz="1800" b="1" dirty="0">
+                <a:solidFill>
+                  <a:srgbClr val="000000"/>
+                </a:solidFill>
+                <a:latin typeface="Consolas" panose="020B0609020204030204" pitchFamily="49" charset="0"/>
+              </a:rPr>
+              <a:t> </a:t>
+            </a:r>
+            <a:r>
+              <a:rPr lang="en-US" sz="1800" b="1" dirty="0" err="1">
+                <a:solidFill>
+                  <a:srgbClr val="000000"/>
+                </a:solidFill>
+                <a:latin typeface="Consolas" panose="020B0609020204030204" pitchFamily="49" charset="0"/>
+              </a:rPr>
+              <a:t>java.util.List</a:t>
+            </a:r>
+            <a:r>
+              <a:rPr lang="en-US" sz="1800" b="1" dirty="0">
+                <a:solidFill>
+                  <a:srgbClr val="000000"/>
+                </a:solidFill>
+                <a:latin typeface="Consolas" panose="020B0609020204030204" pitchFamily="49" charset="0"/>
+              </a:rPr>
+              <a:t>;</a:t>
+            </a:r>
+          </a:p>
+          <a:p>
+            <a:r>
+              <a:rPr lang="en-US" sz="1800" b="1" dirty="0">
+                <a:solidFill>
+                  <a:srgbClr val="7F0055"/>
+                </a:solidFill>
+                <a:latin typeface="Consolas" panose="020B0609020204030204" pitchFamily="49" charset="0"/>
+              </a:rPr>
+              <a:t>import</a:t>
+            </a:r>
+            <a:r>
+              <a:rPr lang="en-US" sz="1800" b="1" dirty="0">
+                <a:solidFill>
+                  <a:srgbClr val="000000"/>
+                </a:solidFill>
+                <a:latin typeface="Consolas" panose="020B0609020204030204" pitchFamily="49" charset="0"/>
+              </a:rPr>
+              <a:t> </a:t>
+            </a:r>
+            <a:r>
+              <a:rPr lang="en-US" sz="1800" b="1" dirty="0" err="1">
+                <a:solidFill>
+                  <a:srgbClr val="000000"/>
+                </a:solidFill>
+                <a:latin typeface="Consolas" panose="020B0609020204030204" pitchFamily="49" charset="0"/>
+              </a:rPr>
+              <a:t>java.util.ArrayList</a:t>
+            </a:r>
+            <a:r>
+              <a:rPr lang="en-US" sz="1800" b="1" dirty="0">
+                <a:solidFill>
+                  <a:srgbClr val="000000"/>
+                </a:solidFill>
+                <a:latin typeface="Consolas" panose="020B0609020204030204" pitchFamily="49" charset="0"/>
+              </a:rPr>
+              <a:t>;</a:t>
+            </a:r>
+          </a:p>
+          <a:p>
+            <a:r>
+              <a:rPr lang="en-US" sz="1800" b="1" dirty="0">
+                <a:solidFill>
+                  <a:srgbClr val="7F0055"/>
+                </a:solidFill>
+                <a:latin typeface="Consolas" panose="020B0609020204030204" pitchFamily="49" charset="0"/>
+              </a:rPr>
+              <a:t>import</a:t>
+            </a:r>
+            <a:r>
+              <a:rPr lang="en-US" sz="1800" b="1" dirty="0">
+                <a:solidFill>
+                  <a:srgbClr val="000000"/>
+                </a:solidFill>
+                <a:latin typeface="Consolas" panose="020B0609020204030204" pitchFamily="49" charset="0"/>
+              </a:rPr>
+              <a:t> </a:t>
+            </a:r>
+            <a:r>
+              <a:rPr lang="en-US" sz="1800" b="1" dirty="0" err="1">
+                <a:solidFill>
+                  <a:srgbClr val="000000"/>
+                </a:solidFill>
+                <a:latin typeface="Consolas" panose="020B0609020204030204" pitchFamily="49" charset="0"/>
+              </a:rPr>
+              <a:t>java.util</a:t>
+            </a:r>
+            <a:r>
+              <a:rPr lang="en-US" sz="1800" b="1" err="1">
+                <a:solidFill>
+                  <a:srgbClr val="000000"/>
+                </a:solidFill>
+                <a:latin typeface="Consolas" panose="020B0609020204030204" pitchFamily="49" charset="0"/>
+              </a:rPr>
+              <a:t>.</a:t>
+            </a:r>
+            <a:r>
+              <a:rPr lang="en-US" sz="1800" b="1">
+                <a:solidFill>
+                  <a:srgbClr val="000000"/>
+                </a:solidFill>
+                <a:latin typeface="Consolas" panose="020B0609020204030204" pitchFamily="49" charset="0"/>
+              </a:rPr>
+              <a:t>Arrays;</a:t>
+            </a:r>
+            <a:endParaRPr lang="en-US" sz="1800" b="1" dirty="0">
+              <a:solidFill>
+                <a:srgbClr val="000000"/>
+              </a:solidFill>
+              <a:latin typeface="Consolas" panose="020B0609020204030204" pitchFamily="49" charset="0"/>
+            </a:endParaRPr>
+          </a:p>
+          <a:p>
+            <a:pPr algn="l"/>
+            <a:r>
+              <a:rPr lang="en-US" sz="1800" b="1" dirty="0">
+                <a:solidFill>
+                  <a:srgbClr val="7F0055"/>
+                </a:solidFill>
+                <a:latin typeface="Consolas" panose="020B0609020204030204" pitchFamily="49" charset="0"/>
+              </a:rPr>
+              <a:t>import</a:t>
+            </a:r>
+            <a:r>
+              <a:rPr lang="en-US" sz="1800" b="1" dirty="0">
+                <a:solidFill>
+                  <a:srgbClr val="000000"/>
+                </a:solidFill>
+                <a:latin typeface="Consolas" panose="020B0609020204030204" pitchFamily="49" charset="0"/>
+              </a:rPr>
+              <a:t> </a:t>
+            </a:r>
+            <a:r>
+              <a:rPr lang="en-US" sz="1800" b="1" dirty="0" err="1">
+                <a:solidFill>
+                  <a:srgbClr val="000000"/>
+                </a:solidFill>
+                <a:latin typeface="Consolas" panose="020B0609020204030204" pitchFamily="49" charset="0"/>
+              </a:rPr>
+              <a:t>java.util.stream.Collectors</a:t>
+            </a:r>
+            <a:r>
+              <a:rPr lang="en-US" sz="1800" b="1" dirty="0">
+                <a:solidFill>
+                  <a:srgbClr val="000000"/>
+                </a:solidFill>
+                <a:latin typeface="Consolas" panose="020B0609020204030204" pitchFamily="49" charset="0"/>
+              </a:rPr>
+              <a:t>;</a:t>
+            </a:r>
+            <a:br>
+              <a:rPr lang="en-US" sz="1800" b="1" dirty="0">
+                <a:solidFill>
+                  <a:srgbClr val="000000"/>
+                </a:solidFill>
+                <a:latin typeface="Consolas" panose="020B0609020204030204" pitchFamily="49" charset="0"/>
+              </a:rPr>
+            </a:br>
+            <a:br>
+              <a:rPr lang="en-US" sz="2000" b="1" dirty="0">
+                <a:latin typeface="Courier New" panose="02070309020205020404" pitchFamily="49" charset="0"/>
+                <a:cs typeface="Courier New" panose="02070309020205020404" pitchFamily="49" charset="0"/>
+              </a:rPr>
+            </a:br>
+            <a:r>
+              <a:rPr lang="en-US" sz="2000" b="1" dirty="0">
+                <a:latin typeface="Courier New" panose="02070309020205020404" pitchFamily="49" charset="0"/>
+                <a:cs typeface="Courier New" panose="02070309020205020404" pitchFamily="49" charset="0"/>
+              </a:rPr>
+              <a:t>public class </a:t>
+            </a:r>
+            <a:r>
+              <a:rPr lang="en-US" sz="2000" dirty="0">
+                <a:latin typeface="Courier New" panose="02070309020205020404" pitchFamily="49" charset="0"/>
+                <a:cs typeface="Courier New" panose="02070309020205020404" pitchFamily="49" charset="0"/>
+              </a:rPr>
+              <a:t>Simulator</a:t>
+            </a:r>
+            <a:r>
+              <a:rPr lang="en-US" sz="2000" b="1" dirty="0">
+                <a:latin typeface="Courier New" panose="02070309020205020404" pitchFamily="49" charset="0"/>
+                <a:cs typeface="Courier New" panose="02070309020205020404" pitchFamily="49" charset="0"/>
+              </a:rPr>
+              <a:t> {</a:t>
+            </a:r>
+          </a:p>
+          <a:p>
+            <a:pPr defTabSz="228600"/>
+            <a:endParaRPr lang="en-US" sz="2000" b="1" dirty="0">
+              <a:latin typeface="Courier New" panose="02070309020205020404" pitchFamily="49" charset="0"/>
+              <a:cs typeface="Courier New" panose="02070309020205020404" pitchFamily="49" charset="0"/>
+            </a:endParaRPr>
+          </a:p>
+          <a:p>
+            <a:pPr defTabSz="228600"/>
+            <a:r>
+              <a:rPr lang="en-US" sz="2000" b="1" dirty="0">
+                <a:latin typeface="Courier New" panose="02070309020205020404" pitchFamily="49" charset="0"/>
+                <a:cs typeface="Courier New" panose="02070309020205020404" pitchFamily="49" charset="0"/>
+              </a:rPr>
+              <a:t>	public static void </a:t>
+            </a:r>
+            <a:r>
+              <a:rPr lang="en-US" sz="2000" dirty="0">
+                <a:latin typeface="Courier New" panose="02070309020205020404" pitchFamily="49" charset="0"/>
+                <a:cs typeface="Courier New" panose="02070309020205020404" pitchFamily="49" charset="0"/>
+              </a:rPr>
+              <a:t>main</a:t>
+            </a:r>
+            <a:r>
+              <a:rPr lang="en-US" sz="2000" b="1" dirty="0">
+                <a:latin typeface="Courier New" panose="02070309020205020404" pitchFamily="49" charset="0"/>
+                <a:cs typeface="Courier New" panose="02070309020205020404" pitchFamily="49" charset="0"/>
+              </a:rPr>
+              <a:t>(String[] </a:t>
+            </a:r>
+            <a:r>
+              <a:rPr lang="en-US" sz="2000" dirty="0" err="1">
+                <a:latin typeface="Courier New" panose="02070309020205020404" pitchFamily="49" charset="0"/>
+                <a:cs typeface="Courier New" panose="02070309020205020404" pitchFamily="49" charset="0"/>
+              </a:rPr>
+              <a:t>args</a:t>
+            </a:r>
+            <a:r>
+              <a:rPr lang="en-US" sz="2000" b="1" dirty="0">
+                <a:latin typeface="Courier New" panose="02070309020205020404" pitchFamily="49" charset="0"/>
+                <a:cs typeface="Courier New" panose="02070309020205020404" pitchFamily="49" charset="0"/>
+              </a:rPr>
+              <a:t>) {</a:t>
+            </a:r>
+            <a:br>
+              <a:rPr lang="en-US" sz="2000" b="1" dirty="0">
+                <a:latin typeface="Courier New" panose="02070309020205020404" pitchFamily="49" charset="0"/>
+                <a:cs typeface="Courier New" panose="02070309020205020404" pitchFamily="49" charset="0"/>
+              </a:rPr>
+            </a:br>
+            <a:r>
+              <a:rPr lang="en-US" sz="2000" b="1" dirty="0">
+                <a:latin typeface="Courier New" panose="02070309020205020404" pitchFamily="49" charset="0"/>
+                <a:cs typeface="Courier New" panose="02070309020205020404" pitchFamily="49" charset="0"/>
+              </a:rPr>
+              <a:t>		List&lt;String&gt; list = </a:t>
+            </a:r>
+            <a:r>
+              <a:rPr lang="en-US" sz="2000" b="1" dirty="0" err="1">
+                <a:latin typeface="Courier New" panose="02070309020205020404" pitchFamily="49" charset="0"/>
+                <a:cs typeface="Courier New" panose="02070309020205020404" pitchFamily="49" charset="0"/>
+              </a:rPr>
+              <a:t>Arrays.asList</a:t>
+            </a:r>
+            <a:r>
+              <a:rPr lang="en-US" sz="2000" b="1" dirty="0">
+                <a:latin typeface="Courier New" panose="02070309020205020404" pitchFamily="49" charset="0"/>
+                <a:cs typeface="Courier New" panose="02070309020205020404" pitchFamily="49" charset="0"/>
+              </a:rPr>
+              <a:t>(“a”, “b”); </a:t>
+            </a:r>
+          </a:p>
+          <a:p>
+            <a:pPr defTabSz="228600"/>
+            <a:r>
+              <a:rPr lang="en-US" sz="2000" b="1" dirty="0">
+                <a:latin typeface="Courier New" panose="02070309020205020404" pitchFamily="49" charset="0"/>
+                <a:cs typeface="Courier New" panose="02070309020205020404" pitchFamily="49" charset="0"/>
+              </a:rPr>
+              <a:t>		List&lt;String&gt; uppercase = </a:t>
+            </a:r>
+            <a:r>
+              <a:rPr lang="en-US" sz="1800" dirty="0" err="1">
+                <a:solidFill>
+                  <a:srgbClr val="6A3E3E"/>
+                </a:solidFill>
+                <a:latin typeface="Consolas" panose="020B0609020204030204" pitchFamily="49" charset="0"/>
+              </a:rPr>
+              <a:t>list</a:t>
+            </a:r>
+            <a:r>
+              <a:rPr lang="en-US" sz="1800" dirty="0" err="1">
+                <a:solidFill>
+                  <a:srgbClr val="000000"/>
+                </a:solidFill>
+                <a:latin typeface="Consolas" panose="020B0609020204030204" pitchFamily="49" charset="0"/>
+              </a:rPr>
+              <a:t>.stream</a:t>
+            </a:r>
+            <a:r>
+              <a:rPr lang="en-US" sz="1800" dirty="0">
+                <a:solidFill>
+                  <a:srgbClr val="000000"/>
+                </a:solidFill>
+                <a:latin typeface="Consolas" panose="020B0609020204030204" pitchFamily="49" charset="0"/>
+              </a:rPr>
+              <a:t>()</a:t>
+            </a:r>
+          </a:p>
+          <a:p>
+            <a:pPr defTabSz="228600"/>
+            <a:r>
+              <a:rPr lang="en-US" dirty="0">
+                <a:solidFill>
+                  <a:srgbClr val="000000"/>
+                </a:solidFill>
+                <a:latin typeface="Consolas" panose="020B0609020204030204" pitchFamily="49" charset="0"/>
+              </a:rPr>
+              <a:t>      </a:t>
+            </a:r>
+            <a:r>
+              <a:rPr lang="en-US" sz="1800" dirty="0">
+                <a:solidFill>
+                  <a:srgbClr val="000000"/>
+                </a:solidFill>
+                <a:latin typeface="Consolas" panose="020B0609020204030204" pitchFamily="49" charset="0"/>
+              </a:rPr>
+              <a:t>.map(</a:t>
+            </a:r>
+            <a:r>
+              <a:rPr lang="en-US" sz="1800" dirty="0">
+                <a:solidFill>
+                  <a:srgbClr val="6A3E3E"/>
+                </a:solidFill>
+                <a:latin typeface="Consolas" panose="020B0609020204030204" pitchFamily="49" charset="0"/>
+              </a:rPr>
+              <a:t>x</a:t>
+            </a:r>
+            <a:r>
+              <a:rPr lang="en-US" sz="1800" dirty="0">
+                <a:solidFill>
+                  <a:srgbClr val="000000"/>
+                </a:solidFill>
+                <a:latin typeface="Consolas" panose="020B0609020204030204" pitchFamily="49" charset="0"/>
+              </a:rPr>
+              <a:t> -&gt; </a:t>
+            </a:r>
+            <a:r>
+              <a:rPr lang="en-US" sz="1800" dirty="0" err="1">
+                <a:solidFill>
+                  <a:srgbClr val="6A3E3E"/>
+                </a:solidFill>
+                <a:latin typeface="Consolas" panose="020B0609020204030204" pitchFamily="49" charset="0"/>
+              </a:rPr>
+              <a:t>x</a:t>
+            </a:r>
+            <a:r>
+              <a:rPr lang="en-US" sz="1800" dirty="0" err="1">
+                <a:solidFill>
+                  <a:srgbClr val="000000"/>
+                </a:solidFill>
+                <a:latin typeface="Consolas" panose="020B0609020204030204" pitchFamily="49" charset="0"/>
+              </a:rPr>
+              <a:t>.toUpperCase</a:t>
+            </a:r>
+            <a:r>
+              <a:rPr lang="en-US" sz="1800" dirty="0">
+                <a:solidFill>
+                  <a:srgbClr val="000000"/>
+                </a:solidFill>
+                <a:latin typeface="Consolas" panose="020B0609020204030204" pitchFamily="49" charset="0"/>
+              </a:rPr>
+              <a:t>())</a:t>
+            </a:r>
+          </a:p>
+          <a:p>
+            <a:pPr defTabSz="228600"/>
+            <a:r>
+              <a:rPr lang="en-US" dirty="0">
+                <a:solidFill>
+                  <a:srgbClr val="000000"/>
+                </a:solidFill>
+                <a:latin typeface="Consolas" panose="020B0609020204030204" pitchFamily="49" charset="0"/>
+              </a:rPr>
+              <a:t>      </a:t>
+            </a:r>
+            <a:r>
+              <a:rPr lang="en-US" sz="1800" dirty="0">
+                <a:solidFill>
+                  <a:srgbClr val="000000"/>
+                </a:solidFill>
+                <a:latin typeface="Consolas" panose="020B0609020204030204" pitchFamily="49" charset="0"/>
+              </a:rPr>
+              <a:t>.collect(</a:t>
+            </a:r>
+            <a:r>
+              <a:rPr lang="en-US" sz="1800" dirty="0" err="1">
+                <a:solidFill>
+                  <a:srgbClr val="000000"/>
+                </a:solidFill>
+                <a:latin typeface="Consolas" panose="020B0609020204030204" pitchFamily="49" charset="0"/>
+              </a:rPr>
+              <a:t>Collectors.</a:t>
+            </a:r>
+            <a:r>
+              <a:rPr lang="en-US" sz="1800" i="1" dirty="0" err="1">
+                <a:solidFill>
+                  <a:srgbClr val="000000"/>
+                </a:solidFill>
+                <a:latin typeface="Consolas" panose="020B0609020204030204" pitchFamily="49" charset="0"/>
+              </a:rPr>
+              <a:t>toList</a:t>
+            </a:r>
+            <a:r>
+              <a:rPr lang="en-US" sz="1800" i="1" dirty="0">
+                <a:solidFill>
+                  <a:srgbClr val="000000"/>
+                </a:solidFill>
+                <a:latin typeface="Consolas" panose="020B0609020204030204" pitchFamily="49" charset="0"/>
+              </a:rPr>
+              <a:t>());</a:t>
+            </a:r>
+            <a:endParaRPr lang="en-US" sz="2000" b="1" dirty="0">
+              <a:latin typeface="Courier New" panose="02070309020205020404" pitchFamily="49" charset="0"/>
+              <a:cs typeface="Courier New" panose="02070309020205020404" pitchFamily="49" charset="0"/>
+            </a:endParaRPr>
+          </a:p>
+          <a:p>
+            <a:pPr defTabSz="228600"/>
+            <a:r>
+              <a:rPr lang="en-US" sz="2000" b="1" dirty="0">
+                <a:latin typeface="Courier New" panose="02070309020205020404" pitchFamily="49" charset="0"/>
+                <a:cs typeface="Courier New" panose="02070309020205020404" pitchFamily="49" charset="0"/>
+              </a:rPr>
+              <a:t>	}</a:t>
+            </a:r>
+          </a:p>
+          <a:p>
+            <a:pPr defTabSz="228600"/>
+            <a:r>
+              <a:rPr lang="en-US" sz="2000" b="1" dirty="0">
+                <a:latin typeface="Courier New" panose="02070309020205020404" pitchFamily="49" charset="0"/>
+                <a:cs typeface="Courier New" panose="02070309020205020404" pitchFamily="49" charset="0"/>
+              </a:rPr>
+              <a:t>}</a:t>
+            </a:r>
+            <a:endParaRPr lang="en-US" sz="2000" dirty="0">
+              <a:latin typeface="Courier New" panose="02070309020205020404" pitchFamily="49" charset="0"/>
+              <a:cs typeface="Courier New" panose="02070309020205020404" pitchFamily="49" charset="0"/>
+            </a:endParaRPr>
+          </a:p>
+        </p:txBody>
+      </p:sp>
+    </p:spTree>
+    <p:extLst>
+      <p:ext uri="{BB962C8B-B14F-4D97-AF65-F5344CB8AC3E}">
+        <p14:creationId xmlns:p14="http://schemas.microsoft.com/office/powerpoint/2010/main" val="166921318"/>
+      </p:ext>
+    </p:extLst>
+  </p:cSld>
+  <p:clrMapOvr>
+    <a:masterClrMapping/>
+  </p:clrMapOvr>
+</p:sld>
+</file>
+
+<file path=ppt/slides/slide9.xml><?xml version="1.0" encoding="utf-8"?>
 <p:sld xmlns:a="http://schemas.openxmlformats.org/drawingml/2006/main" xmlns:r="http://schemas.openxmlformats.org/officeDocument/2006/relationships" xmlns:p="http://schemas.openxmlformats.org/presentationml/2006/main">
   <p:cSld>
     <p:spTree>
@@ -40026,7 +42008,7 @@
             </a:pPr>
             <a:fld id="{00000000-1234-1234-1234-123412341234}" type="slidenum">
               <a:rPr lang="en-US" smtClean="0"/>
-              <a:t>6</a:t>
+              <a:t>8</a:t>
             </a:fld>
             <a:endParaRPr lang="en-US"/>
           </a:p>
@@ -40036,411 +42018,6 @@
     <p:extLst>
       <p:ext uri="{BB962C8B-B14F-4D97-AF65-F5344CB8AC3E}">
         <p14:creationId xmlns:p14="http://schemas.microsoft.com/office/powerpoint/2010/main" val="1245995033"/>
-      </p:ext>
-    </p:extLst>
-  </p:cSld>
-  <p:clrMapOvr>
-    <a:masterClrMapping/>
-  </p:clrMapOvr>
-</p:sld>
-</file>
-
-<file path=ppt/slides/slide8.xml><?xml version="1.0" encoding="utf-8"?>
-<p:sld xmlns:a="http://schemas.openxmlformats.org/drawingml/2006/main" xmlns:r="http://schemas.openxmlformats.org/officeDocument/2006/relationships" xmlns:p="http://schemas.openxmlformats.org/presentationml/2006/main">
-  <p:cSld>
-    <p:spTree>
-      <p:nvGrpSpPr>
-        <p:cNvPr id="1" name=""/>
-        <p:cNvGrpSpPr/>
-        <p:nvPr/>
-      </p:nvGrpSpPr>
-      <p:grpSpPr>
-        <a:xfrm>
-          <a:off x="0" y="0"/>
-          <a:ext cx="0" cy="0"/>
-          <a:chOff x="0" y="0"/>
-          <a:chExt cx="0" cy="0"/>
-        </a:xfrm>
-      </p:grpSpPr>
-      <p:sp>
-        <p:nvSpPr>
-          <p:cNvPr id="2" name="Title 1">
-            <a:extLst>
-              <a:ext uri="{FF2B5EF4-FFF2-40B4-BE49-F238E27FC236}">
-                <a16:creationId xmlns:a16="http://schemas.microsoft.com/office/drawing/2014/main" id="{437930B4-E996-4435-B9F1-D407853E2C03}"/>
-              </a:ext>
-            </a:extLst>
-          </p:cNvPr>
-          <p:cNvSpPr>
-            <a:spLocks noGrp="1"/>
-          </p:cNvSpPr>
-          <p:nvPr>
-            <p:ph type="title"/>
-          </p:nvPr>
-        </p:nvSpPr>
-        <p:spPr/>
-        <p:txBody>
-          <a:bodyPr/>
-          <a:lstStyle/>
-          <a:p>
-            <a:r>
-              <a:rPr lang="en-US" dirty="0"/>
-              <a:t>Reflections API</a:t>
-            </a:r>
-          </a:p>
-        </p:txBody>
-      </p:sp>
-      <p:sp>
-        <p:nvSpPr>
-          <p:cNvPr id="3" name="Text Placeholder 2">
-            <a:extLst>
-              <a:ext uri="{FF2B5EF4-FFF2-40B4-BE49-F238E27FC236}">
-                <a16:creationId xmlns:a16="http://schemas.microsoft.com/office/drawing/2014/main" id="{0C6BA468-B2FB-4410-8CC4-82872A4103B6}"/>
-              </a:ext>
-            </a:extLst>
-          </p:cNvPr>
-          <p:cNvSpPr>
-            <a:spLocks noGrp="1"/>
-          </p:cNvSpPr>
-          <p:nvPr>
-            <p:ph type="body" idx="1"/>
-          </p:nvPr>
-        </p:nvSpPr>
-        <p:spPr>
-          <a:xfrm>
-            <a:off x="380010" y="1378226"/>
-            <a:ext cx="8383980" cy="5350611"/>
-          </a:xfrm>
-        </p:spPr>
-        <p:txBody>
-          <a:bodyPr>
-            <a:normAutofit fontScale="77500" lnSpcReduction="20000"/>
-          </a:bodyPr>
-          <a:lstStyle/>
-          <a:p>
-            <a:r>
-              <a:rPr lang="en-US" dirty="0"/>
-              <a:t>The reflections API includes (but is not limited to):</a:t>
-            </a:r>
-          </a:p>
-          <a:p>
-            <a:pPr lvl="1"/>
-            <a:r>
-              <a:rPr lang="en-US" b="1" dirty="0"/>
-              <a:t>Class*</a:t>
-            </a:r>
-            <a:r>
-              <a:rPr lang="en-US" dirty="0"/>
-              <a:t> – provides a representation of classes and interfaces running in a java application</a:t>
-            </a:r>
-          </a:p>
-          <a:p>
-            <a:pPr lvl="2"/>
-            <a:r>
-              <a:rPr lang="en-US" dirty="0"/>
-              <a:t>*Technically Class is part of the </a:t>
-            </a:r>
-            <a:r>
-              <a:rPr lang="en-US" dirty="0" err="1"/>
-              <a:t>java.lang</a:t>
-            </a:r>
-            <a:r>
-              <a:rPr lang="en-US" dirty="0"/>
-              <a:t> package, but is widely used in the reflections API, and reflection operations.</a:t>
-            </a:r>
-          </a:p>
-          <a:p>
-            <a:pPr lvl="1"/>
-            <a:r>
-              <a:rPr lang="en-US" b="1" dirty="0"/>
-              <a:t>Constructor</a:t>
-            </a:r>
-            <a:r>
-              <a:rPr lang="en-US" dirty="0"/>
-              <a:t> – provides a representation of, and access to, a constructor method declared in a class.</a:t>
-            </a:r>
-          </a:p>
-          <a:p>
-            <a:pPr lvl="1"/>
-            <a:r>
-              <a:rPr lang="en-US" b="1" dirty="0"/>
-              <a:t>Method</a:t>
-            </a:r>
-            <a:r>
-              <a:rPr lang="en-US" dirty="0"/>
-              <a:t> – provides a representation of, and access to, a single method declared in a class, including access information and parameters. Method can be instance or class methods, as well as abstract.</a:t>
-            </a:r>
-            <a:endParaRPr lang="en-US" b="1" dirty="0"/>
-          </a:p>
-          <a:p>
-            <a:pPr lvl="1"/>
-            <a:r>
-              <a:rPr lang="en-US" b="1" dirty="0"/>
-              <a:t>Field</a:t>
-            </a:r>
-            <a:r>
-              <a:rPr lang="en-US" dirty="0"/>
-              <a:t> – provides a representation of, and access to, a single field/variable declared in a class, including access information, modifiers and datatype. Field can be static or instance.</a:t>
-            </a:r>
-          </a:p>
-          <a:p>
-            <a:pPr lvl="1"/>
-            <a:r>
-              <a:rPr lang="en-US" b="1" dirty="0"/>
-              <a:t>Modifier</a:t>
-            </a:r>
-            <a:r>
-              <a:rPr lang="en-US" dirty="0"/>
-              <a:t> – a class that provides static methods and constants used to decode modifiers on a method or field.</a:t>
-            </a:r>
-          </a:p>
-          <a:p>
-            <a:pPr lvl="2"/>
-            <a:r>
-              <a:rPr lang="en-US" dirty="0"/>
-              <a:t>Modifiers are represented using integers with distinct bit positions.</a:t>
-            </a:r>
-          </a:p>
-          <a:p>
-            <a:pPr lvl="1"/>
-            <a:r>
-              <a:rPr lang="en-US" b="1" dirty="0"/>
-              <a:t>Parameter</a:t>
-            </a:r>
-            <a:r>
-              <a:rPr lang="en-US" dirty="0"/>
-              <a:t> – a class which represents information about a method’s parameters, including the name, modifiers and parameter position.</a:t>
-            </a:r>
-          </a:p>
-        </p:txBody>
-      </p:sp>
-      <p:sp>
-        <p:nvSpPr>
-          <p:cNvPr id="4" name="Slide Number Placeholder 3">
-            <a:extLst>
-              <a:ext uri="{FF2B5EF4-FFF2-40B4-BE49-F238E27FC236}">
-                <a16:creationId xmlns:a16="http://schemas.microsoft.com/office/drawing/2014/main" id="{483A7CCD-D4F0-4527-9651-963B2389435E}"/>
-              </a:ext>
-            </a:extLst>
-          </p:cNvPr>
-          <p:cNvSpPr>
-            <a:spLocks noGrp="1"/>
-          </p:cNvSpPr>
-          <p:nvPr>
-            <p:ph type="sldNum" idx="12"/>
-          </p:nvPr>
-        </p:nvSpPr>
-        <p:spPr/>
-        <p:txBody>
-          <a:bodyPr/>
-          <a:lstStyle/>
-          <a:p>
-            <a:pPr marL="0" lvl="0" indent="0" algn="r" rtl="0">
-              <a:spcBef>
-                <a:spcPts val="0"/>
-              </a:spcBef>
-              <a:spcAft>
-                <a:spcPts val="0"/>
-              </a:spcAft>
-              <a:buNone/>
-            </a:pPr>
-            <a:fld id="{00000000-1234-1234-1234-123412341234}" type="slidenum">
-              <a:rPr lang="en-US" smtClean="0"/>
-              <a:t>7</a:t>
-            </a:fld>
-            <a:endParaRPr lang="en-US"/>
-          </a:p>
-        </p:txBody>
-      </p:sp>
-    </p:spTree>
-    <p:extLst>
-      <p:ext uri="{BB962C8B-B14F-4D97-AF65-F5344CB8AC3E}">
-        <p14:creationId xmlns:p14="http://schemas.microsoft.com/office/powerpoint/2010/main" val="90686638"/>
-      </p:ext>
-    </p:extLst>
-  </p:cSld>
-  <p:clrMapOvr>
-    <a:masterClrMapping/>
-  </p:clrMapOvr>
-</p:sld>
-</file>
-
-<file path=ppt/slides/slide9.xml><?xml version="1.0" encoding="utf-8"?>
-<p:sld xmlns:a="http://schemas.openxmlformats.org/drawingml/2006/main" xmlns:r="http://schemas.openxmlformats.org/officeDocument/2006/relationships" xmlns:p="http://schemas.openxmlformats.org/presentationml/2006/main">
-  <p:cSld>
-    <p:spTree>
-      <p:nvGrpSpPr>
-        <p:cNvPr id="1" name=""/>
-        <p:cNvGrpSpPr/>
-        <p:nvPr/>
-      </p:nvGrpSpPr>
-      <p:grpSpPr>
-        <a:xfrm>
-          <a:off x="0" y="0"/>
-          <a:ext cx="0" cy="0"/>
-          <a:chOff x="0" y="0"/>
-          <a:chExt cx="0" cy="0"/>
-        </a:xfrm>
-      </p:grpSpPr>
-      <p:sp>
-        <p:nvSpPr>
-          <p:cNvPr id="2" name="Title 1">
-            <a:extLst>
-              <a:ext uri="{FF2B5EF4-FFF2-40B4-BE49-F238E27FC236}">
-                <a16:creationId xmlns:a16="http://schemas.microsoft.com/office/drawing/2014/main" id="{437930B4-E996-4435-B9F1-D407853E2C03}"/>
-              </a:ext>
-            </a:extLst>
-          </p:cNvPr>
-          <p:cNvSpPr>
-            <a:spLocks noGrp="1"/>
-          </p:cNvSpPr>
-          <p:nvPr>
-            <p:ph type="title"/>
-          </p:nvPr>
-        </p:nvSpPr>
-        <p:spPr/>
-        <p:txBody>
-          <a:bodyPr/>
-          <a:lstStyle/>
-          <a:p>
-            <a:r>
-              <a:rPr lang="en-US" dirty="0"/>
-              <a:t>Class Features</a:t>
-            </a:r>
-          </a:p>
-        </p:txBody>
-      </p:sp>
-      <p:sp>
-        <p:nvSpPr>
-          <p:cNvPr id="3" name="Text Placeholder 2">
-            <a:extLst>
-              <a:ext uri="{FF2B5EF4-FFF2-40B4-BE49-F238E27FC236}">
-                <a16:creationId xmlns:a16="http://schemas.microsoft.com/office/drawing/2014/main" id="{0C6BA468-B2FB-4410-8CC4-82872A4103B6}"/>
-              </a:ext>
-            </a:extLst>
-          </p:cNvPr>
-          <p:cNvSpPr>
-            <a:spLocks noGrp="1"/>
-          </p:cNvSpPr>
-          <p:nvPr>
-            <p:ph type="body" idx="1"/>
-          </p:nvPr>
-        </p:nvSpPr>
-        <p:spPr>
-          <a:xfrm>
-            <a:off x="380010" y="1378226"/>
-            <a:ext cx="8383980" cy="5350611"/>
-          </a:xfrm>
-        </p:spPr>
-        <p:txBody>
-          <a:bodyPr>
-            <a:normAutofit fontScale="85000" lnSpcReduction="10000"/>
-          </a:bodyPr>
-          <a:lstStyle/>
-          <a:p>
-            <a:r>
-              <a:rPr lang="en-US" b="1" dirty="0"/>
-              <a:t>cast </a:t>
-            </a:r>
-            <a:r>
-              <a:rPr lang="en-US" dirty="0"/>
-              <a:t>– casts the object as a representation of another.</a:t>
-            </a:r>
-          </a:p>
-          <a:p>
-            <a:r>
-              <a:rPr lang="en-US" b="1" dirty="0" err="1"/>
-              <a:t>getDeclaredConstructor</a:t>
-            </a:r>
-            <a:r>
-              <a:rPr lang="en-US" dirty="0"/>
-              <a:t> – returns a Constructor object that reflects the constructor specified by parameter types</a:t>
-            </a:r>
-          </a:p>
-          <a:p>
-            <a:r>
-              <a:rPr lang="en-US" b="1" dirty="0" err="1"/>
-              <a:t>getConstructors</a:t>
-            </a:r>
-            <a:r>
-              <a:rPr lang="en-US" dirty="0"/>
-              <a:t> – returns an array containing Constructor objects which reflect all public constructors of the class</a:t>
-            </a:r>
-          </a:p>
-          <a:p>
-            <a:r>
-              <a:rPr lang="en-US" b="1" dirty="0" err="1"/>
-              <a:t>getDeclaredMethods</a:t>
-            </a:r>
-            <a:r>
-              <a:rPr lang="en-US" dirty="0"/>
-              <a:t> – returns an array containing Method objects which reflect all methods declared in a class</a:t>
-            </a:r>
-          </a:p>
-          <a:p>
-            <a:r>
-              <a:rPr lang="en-US" b="1" dirty="0" err="1"/>
-              <a:t>getMethod</a:t>
-            </a:r>
-            <a:r>
-              <a:rPr lang="en-US" dirty="0"/>
-              <a:t> - returns a method object that matches a given name and parameter list</a:t>
-            </a:r>
-          </a:p>
-          <a:p>
-            <a:r>
-              <a:rPr lang="en-US" b="1" dirty="0" err="1"/>
-              <a:t>getDeclaredFields</a:t>
-            </a:r>
-            <a:r>
-              <a:rPr lang="en-US" dirty="0"/>
-              <a:t> – returns an array containing Field objects which reflect all fields declared in a class.</a:t>
-            </a:r>
-          </a:p>
-        </p:txBody>
-      </p:sp>
-      <p:sp>
-        <p:nvSpPr>
-          <p:cNvPr id="4" name="Slide Number Placeholder 3">
-            <a:extLst>
-              <a:ext uri="{FF2B5EF4-FFF2-40B4-BE49-F238E27FC236}">
-                <a16:creationId xmlns:a16="http://schemas.microsoft.com/office/drawing/2014/main" id="{483A7CCD-D4F0-4527-9651-963B2389435E}"/>
-              </a:ext>
-            </a:extLst>
-          </p:cNvPr>
-          <p:cNvSpPr>
-            <a:spLocks noGrp="1"/>
-          </p:cNvSpPr>
-          <p:nvPr>
-            <p:ph type="sldNum" idx="12"/>
-          </p:nvPr>
-        </p:nvSpPr>
-        <p:spPr/>
-        <p:txBody>
-          <a:bodyPr/>
-          <a:lstStyle/>
-          <a:p>
-            <a:pPr marL="0" lvl="0" indent="0" algn="r" rtl="0">
-              <a:spcBef>
-                <a:spcPts val="0"/>
-              </a:spcBef>
-              <a:spcAft>
-                <a:spcPts val="0"/>
-              </a:spcAft>
-              <a:buNone/>
-            </a:pPr>
-            <a:fld id="{00000000-1234-1234-1234-123412341234}" type="slidenum">
-              <a:rPr lang="en-US" smtClean="0"/>
-              <a:t>8</a:t>
-            </a:fld>
-            <a:endParaRPr lang="en-US"/>
-          </a:p>
-        </p:txBody>
-      </p:sp>
-    </p:spTree>
-    <p:extLst>
-      <p:ext uri="{BB962C8B-B14F-4D97-AF65-F5344CB8AC3E}">
-        <p14:creationId xmlns:p14="http://schemas.microsoft.com/office/powerpoint/2010/main" val="1284339430"/>
       </p:ext>
     </p:extLst>
   </p:cSld>

</xml_diff>